<commit_message>
Made some tweaks to the flocking code. Updated presentation.
</commit_message>
<xml_diff>
--- a/flocking.pptx
+++ b/flocking.pptx
@@ -20,13 +20,10 @@
     <p:sldId id="266" r:id="rId14"/>
     <p:sldId id="267" r:id="rId15"/>
     <p:sldId id="268" r:id="rId16"/>
-    <p:sldId id="274" r:id="rId17"/>
-    <p:sldId id="269" r:id="rId18"/>
-    <p:sldId id="272" r:id="rId19"/>
-    <p:sldId id="270" r:id="rId20"/>
-    <p:sldId id="271" r:id="rId21"/>
-    <p:sldId id="275" r:id="rId22"/>
-    <p:sldId id="276" r:id="rId23"/>
+    <p:sldId id="269" r:id="rId17"/>
+    <p:sldId id="270" r:id="rId18"/>
+    <p:sldId id="275" r:id="rId19"/>
+    <p:sldId id="276" r:id="rId20"/>
   </p:sldIdLst>
   <p:sldSz cx="12192000" cy="6858000"/>
   <p:notesSz cx="6858000" cy="9144000"/>
@@ -322,7 +319,7 @@
             <a:fld id="{B61BEF0D-F0BB-DE4B-95CE-6DB70DBA9567}" type="datetimeFigureOut">
               <a:rPr lang="en-US" smtClean="0"/>
               <a:pPr/>
-              <a:t>5/5/14</a:t>
+              <a:t>5/23/2015</a:t>
             </a:fld>
             <a:endParaRPr lang="en-US" dirty="0"/>
           </a:p>
@@ -662,7 +659,7 @@
             <a:fld id="{B61BEF0D-F0BB-DE4B-95CE-6DB70DBA9567}" type="datetimeFigureOut">
               <a:rPr lang="en-US" smtClean="0"/>
               <a:pPr/>
-              <a:t>5/5/14</a:t>
+              <a:t>5/23/2015</a:t>
             </a:fld>
             <a:endParaRPr lang="en-US" dirty="0"/>
           </a:p>
@@ -1065,7 +1062,7 @@
             <a:fld id="{B61BEF0D-F0BB-DE4B-95CE-6DB70DBA9567}" type="datetimeFigureOut">
               <a:rPr lang="en-US" smtClean="0"/>
               <a:pPr/>
-              <a:t>5/5/14</a:t>
+              <a:t>5/23/2015</a:t>
             </a:fld>
             <a:endParaRPr lang="en-US" dirty="0"/>
           </a:p>
@@ -1403,7 +1400,7 @@
             <a:fld id="{B61BEF0D-F0BB-DE4B-95CE-6DB70DBA9567}" type="datetimeFigureOut">
               <a:rPr lang="en-US" smtClean="0"/>
               <a:pPr/>
-              <a:t>5/5/14</a:t>
+              <a:t>5/23/2015</a:t>
             </a:fld>
             <a:endParaRPr lang="en-US" dirty="0"/>
           </a:p>
@@ -1725,7 +1722,7 @@
             <a:fld id="{B61BEF0D-F0BB-DE4B-95CE-6DB70DBA9567}" type="datetimeFigureOut">
               <a:rPr lang="en-US" smtClean="0"/>
               <a:pPr/>
-              <a:t>5/5/14</a:t>
+              <a:t>5/23/2015</a:t>
             </a:fld>
             <a:endParaRPr lang="en-US" dirty="0"/>
           </a:p>
@@ -2123,7 +2120,7 @@
             <a:fld id="{B61BEF0D-F0BB-DE4B-95CE-6DB70DBA9567}" type="datetimeFigureOut">
               <a:rPr lang="en-US" smtClean="0"/>
               <a:pPr/>
-              <a:t>5/5/14</a:t>
+              <a:t>5/23/2015</a:t>
             </a:fld>
             <a:endParaRPr lang="en-US" dirty="0"/>
           </a:p>
@@ -2382,7 +2379,7 @@
             <a:fld id="{B61BEF0D-F0BB-DE4B-95CE-6DB70DBA9567}" type="datetimeFigureOut">
               <a:rPr lang="en-US" smtClean="0"/>
               <a:pPr/>
-              <a:t>5/5/14</a:t>
+              <a:t>5/23/2015</a:t>
             </a:fld>
             <a:endParaRPr lang="en-US" dirty="0"/>
           </a:p>
@@ -2646,7 +2643,7 @@
             <a:fld id="{B61BEF0D-F0BB-DE4B-95CE-6DB70DBA9567}" type="datetimeFigureOut">
               <a:rPr lang="en-US" smtClean="0"/>
               <a:pPr/>
-              <a:t>5/5/14</a:t>
+              <a:t>5/23/2015</a:t>
             </a:fld>
             <a:endParaRPr lang="en-US" dirty="0"/>
           </a:p>
@@ -2910,7 +2907,7 @@
             <a:fld id="{B61BEF0D-F0BB-DE4B-95CE-6DB70DBA9567}" type="datetimeFigureOut">
               <a:rPr lang="en-US" smtClean="0"/>
               <a:pPr/>
-              <a:t>5/5/14</a:t>
+              <a:t>5/23/2015</a:t>
             </a:fld>
             <a:endParaRPr lang="en-US" dirty="0"/>
           </a:p>
@@ -3241,7 +3238,7 @@
             <a:fld id="{B61BEF0D-F0BB-DE4B-95CE-6DB70DBA9567}" type="datetimeFigureOut">
               <a:rPr lang="en-US" smtClean="0"/>
               <a:pPr/>
-              <a:t>5/5/14</a:t>
+              <a:t>5/23/2015</a:t>
             </a:fld>
             <a:endParaRPr lang="en-US" dirty="0"/>
           </a:p>
@@ -3566,7 +3563,7 @@
             <a:fld id="{B61BEF0D-F0BB-DE4B-95CE-6DB70DBA9567}" type="datetimeFigureOut">
               <a:rPr lang="en-US" smtClean="0"/>
               <a:pPr/>
-              <a:t>5/5/14</a:t>
+              <a:t>5/23/2015</a:t>
             </a:fld>
             <a:endParaRPr lang="en-US" dirty="0"/>
           </a:p>
@@ -4025,7 +4022,7 @@
             <a:fld id="{B61BEF0D-F0BB-DE4B-95CE-6DB70DBA9567}" type="datetimeFigureOut">
               <a:rPr lang="en-US" smtClean="0"/>
               <a:pPr/>
-              <a:t>5/5/14</a:t>
+              <a:t>5/23/2015</a:t>
             </a:fld>
             <a:endParaRPr lang="en-US" dirty="0"/>
           </a:p>
@@ -4232,7 +4229,7 @@
             <a:fld id="{B61BEF0D-F0BB-DE4B-95CE-6DB70DBA9567}" type="datetimeFigureOut">
               <a:rPr lang="en-US" smtClean="0"/>
               <a:pPr/>
-              <a:t>5/5/14</a:t>
+              <a:t>5/23/2015</a:t>
             </a:fld>
             <a:endParaRPr lang="en-US" dirty="0"/>
           </a:p>
@@ -4411,7 +4408,7 @@
             <a:fld id="{B61BEF0D-F0BB-DE4B-95CE-6DB70DBA9567}" type="datetimeFigureOut">
               <a:rPr lang="en-US" smtClean="0"/>
               <a:pPr/>
-              <a:t>5/5/14</a:t>
+              <a:t>5/23/2015</a:t>
             </a:fld>
             <a:endParaRPr lang="en-US" dirty="0"/>
           </a:p>
@@ -4746,7 +4743,7 @@
             <a:fld id="{B61BEF0D-F0BB-DE4B-95CE-6DB70DBA9567}" type="datetimeFigureOut">
               <a:rPr lang="en-US" smtClean="0"/>
               <a:pPr/>
-              <a:t>5/5/14</a:t>
+              <a:t>5/23/2015</a:t>
             </a:fld>
             <a:endParaRPr lang="en-US" dirty="0"/>
           </a:p>
@@ -5093,7 +5090,7 @@
             <a:fld id="{B61BEF0D-F0BB-DE4B-95CE-6DB70DBA9567}" type="datetimeFigureOut">
               <a:rPr lang="en-US" smtClean="0"/>
               <a:pPr/>
-              <a:t>5/5/14</a:t>
+              <a:t>5/23/2015</a:t>
             </a:fld>
             <a:endParaRPr lang="en-US" dirty="0"/>
           </a:p>
@@ -7212,7 +7209,7 @@
             <a:fld id="{B61BEF0D-F0BB-DE4B-95CE-6DB70DBA9567}" type="datetimeFigureOut">
               <a:rPr lang="en-US" smtClean="0"/>
               <a:pPr/>
-              <a:t>5/5/14</a:t>
+              <a:t>5/23/2015</a:t>
             </a:fld>
             <a:endParaRPr lang="en-US" dirty="0"/>
           </a:p>
@@ -7747,10 +7744,14 @@
           <a:lstStyle/>
           <a:p>
             <a:r>
-              <a:rPr lang="en-US" dirty="0" smtClean="0"/>
+              <a:rPr lang="en-US" dirty="0" smtClean="0">
+                <a:latin typeface="Calibri" panose="020F0502020204030204" pitchFamily="34" charset="0"/>
+              </a:rPr>
               <a:t>Flocking</a:t>
             </a:r>
-            <a:endParaRPr lang="en-US" dirty="0"/>
+            <a:endParaRPr lang="en-US" dirty="0">
+              <a:latin typeface="Calibri" panose="020F0502020204030204" pitchFamily="34" charset="0"/>
+            </a:endParaRPr>
           </a:p>
         </p:txBody>
       </p:sp>
@@ -7770,24 +7771,36 @@
           <a:lstStyle/>
           <a:p>
             <a:r>
-              <a:rPr lang="en-US" dirty="0" smtClean="0"/>
+              <a:rPr lang="en-US" dirty="0" smtClean="0">
+                <a:latin typeface="Calibri" panose="020F0502020204030204" pitchFamily="34" charset="0"/>
+              </a:rPr>
               <a:t>Nat Guy</a:t>
             </a:r>
             <a:br>
-              <a:rPr lang="en-US" dirty="0" smtClean="0"/>
+              <a:rPr lang="en-US" dirty="0" smtClean="0">
+                <a:latin typeface="Calibri" panose="020F0502020204030204" pitchFamily="34" charset="0"/>
+              </a:rPr>
             </a:br>
             <a:r>
-              <a:rPr lang="en-US" dirty="0" smtClean="0"/>
+              <a:rPr lang="en-US" dirty="0" smtClean="0">
+                <a:latin typeface="Calibri" panose="020F0502020204030204" pitchFamily="34" charset="0"/>
+              </a:rPr>
               <a:t/>
             </a:r>
             <a:br>
-              <a:rPr lang="en-US" dirty="0" smtClean="0"/>
+              <a:rPr lang="en-US" dirty="0" smtClean="0">
+                <a:latin typeface="Calibri" panose="020F0502020204030204" pitchFamily="34" charset="0"/>
+              </a:rPr>
             </a:br>
             <a:r>
-              <a:rPr lang="en-US" dirty="0" smtClean="0"/>
+              <a:rPr lang="en-US" dirty="0" smtClean="0">
+                <a:latin typeface="Calibri" panose="020F0502020204030204" pitchFamily="34" charset="0"/>
+              </a:rPr>
               <a:t>(Some slides borrowed from John See at Multimedia University, Malaysia)</a:t>
             </a:r>
-            <a:endParaRPr lang="en-US" dirty="0"/>
+            <a:endParaRPr lang="en-US" dirty="0">
+              <a:latin typeface="Calibri" panose="020F0502020204030204" pitchFamily="34" charset="0"/>
+            </a:endParaRPr>
           </a:p>
         </p:txBody>
       </p:sp>
@@ -7804,7 +7817,7 @@
   <p:timing>
     <p:tnLst>
       <p:par>
-        <p:cTn xmlns:p14="http://schemas.microsoft.com/office/powerpoint/2010/main" id="1" dur="indefinite" restart="never" nodeType="tmRoot"/>
+        <p:cTn id="1" dur="indefinite" restart="never" nodeType="tmRoot"/>
       </p:par>
     </p:tnLst>
   </p:timing>
@@ -7844,10 +7857,26 @@
           <a:lstStyle/>
           <a:p>
             <a:r>
-              <a:rPr lang="en-US" dirty="0" smtClean="0"/>
-              <a:t>Mackerel Video</a:t>
-            </a:r>
-            <a:endParaRPr lang="en-US" dirty="0"/>
+              <a:rPr lang="en-US" dirty="0" smtClean="0">
+                <a:latin typeface="Calibri" panose="020F0502020204030204" pitchFamily="34" charset="0"/>
+              </a:rPr>
+              <a:t>Mackerel “</a:t>
+            </a:r>
+            <a:r>
+              <a:rPr lang="en-US" dirty="0" err="1" smtClean="0">
+                <a:latin typeface="Calibri" panose="020F0502020204030204" pitchFamily="34" charset="0"/>
+              </a:rPr>
+              <a:t>Baitball</a:t>
+            </a:r>
+            <a:r>
+              <a:rPr lang="en-US" dirty="0" smtClean="0">
+                <a:latin typeface="Calibri" panose="020F0502020204030204" pitchFamily="34" charset="0"/>
+              </a:rPr>
+              <a:t>” Video</a:t>
+            </a:r>
+            <a:endParaRPr lang="en-US" dirty="0">
+              <a:latin typeface="Calibri" panose="020F0502020204030204" pitchFamily="34" charset="0"/>
+            </a:endParaRPr>
           </a:p>
         </p:txBody>
       </p:sp>
@@ -7868,26 +7897,48 @@
           </a:bodyPr>
           <a:lstStyle/>
           <a:p>
-            <a:r>
-              <a:rPr lang="en-US" sz="2400" dirty="0"/>
+            <a:pPr>
+              <a:buFont typeface="Arial" panose="020B0604020202020204" pitchFamily="34" charset="0"/>
+              <a:buChar char="•"/>
+            </a:pPr>
+            <a:r>
+              <a:rPr lang="en-US" sz="2400" dirty="0">
+                <a:latin typeface="Calibri" panose="020F0502020204030204" pitchFamily="34" charset="0"/>
+                <a:hlinkClick r:id="rId2"/>
+              </a:rPr>
               <a:t>https://</a:t>
             </a:r>
             <a:r>
-              <a:rPr lang="en-US" sz="2400" dirty="0" err="1"/>
+              <a:rPr lang="en-US" sz="2400" dirty="0" err="1">
+                <a:latin typeface="Calibri" panose="020F0502020204030204" pitchFamily="34" charset="0"/>
+                <a:hlinkClick r:id="rId2"/>
+              </a:rPr>
               <a:t>www.youtube.com</a:t>
             </a:r>
             <a:r>
-              <a:rPr lang="en-US" sz="2400" dirty="0"/>
+              <a:rPr lang="en-US" sz="2400" dirty="0">
+                <a:latin typeface="Calibri" panose="020F0502020204030204" pitchFamily="34" charset="0"/>
+                <a:hlinkClick r:id="rId2"/>
+              </a:rPr>
               <a:t>/</a:t>
             </a:r>
             <a:r>
-              <a:rPr lang="en-US" sz="2400" dirty="0" err="1"/>
+              <a:rPr lang="en-US" sz="2400" dirty="0" err="1">
+                <a:latin typeface="Calibri" panose="020F0502020204030204" pitchFamily="34" charset="0"/>
+                <a:hlinkClick r:id="rId2"/>
+              </a:rPr>
               <a:t>watch?v</a:t>
             </a:r>
             <a:r>
-              <a:rPr lang="en-US" sz="2400" dirty="0"/>
+              <a:rPr lang="en-US" sz="2400" dirty="0">
+                <a:latin typeface="Calibri" panose="020F0502020204030204" pitchFamily="34" charset="0"/>
+                <a:hlinkClick r:id="rId2"/>
+              </a:rPr>
               <a:t>=r1m6IKiO26c#t=82</a:t>
             </a:r>
+            <a:endParaRPr lang="en-US" sz="2400" dirty="0">
+              <a:latin typeface="Calibri" panose="020F0502020204030204" pitchFamily="34" charset="0"/>
+            </a:endParaRPr>
           </a:p>
         </p:txBody>
       </p:sp>
@@ -7904,7 +7955,7 @@
   <p:timing>
     <p:tnLst>
       <p:par>
-        <p:cTn xmlns:p14="http://schemas.microsoft.com/office/powerpoint/2010/main" id="1" dur="indefinite" restart="never" nodeType="tmRoot"/>
+        <p:cTn id="1" dur="indefinite" restart="never" nodeType="tmRoot"/>
       </p:par>
     </p:tnLst>
   </p:timing>
@@ -7944,10 +7995,14 @@
           <a:lstStyle/>
           <a:p>
             <a:r>
-              <a:rPr lang="en-US" dirty="0" smtClean="0"/>
+              <a:rPr lang="en-US" dirty="0" smtClean="0">
+                <a:latin typeface="Calibri" panose="020F0502020204030204" pitchFamily="34" charset="0"/>
+              </a:rPr>
               <a:t>Neighborhood</a:t>
             </a:r>
-            <a:endParaRPr lang="en-US" dirty="0"/>
+            <a:endParaRPr lang="en-US" dirty="0">
+              <a:latin typeface="Calibri" panose="020F0502020204030204" pitchFamily="34" charset="0"/>
+            </a:endParaRPr>
           </a:p>
         </p:txBody>
       </p:sp>
@@ -7968,17 +8023,28 @@
           </a:bodyPr>
           <a:lstStyle/>
           <a:p>
-            <a:r>
-              <a:rPr lang="en-US" sz="2400" dirty="0" smtClean="0"/>
+            <a:pPr>
+              <a:buFont typeface="Arial" panose="020B0604020202020204" pitchFamily="34" charset="0"/>
+              <a:buChar char="•"/>
+            </a:pPr>
+            <a:r>
+              <a:rPr lang="en-US" sz="2400" dirty="0" smtClean="0">
+                <a:latin typeface="Calibri" panose="020F0502020204030204" pitchFamily="34" charset="0"/>
+              </a:rPr>
               <a:t>Range in which units can detect other units</a:t>
             </a:r>
-            <a:endParaRPr lang="en-MY" sz="2400" dirty="0"/>
-          </a:p>
-          <a:p>
-            <a:pPr marL="0" indent="0">
-              <a:buNone/>
+            <a:endParaRPr lang="en-MY" sz="2400" dirty="0">
+              <a:latin typeface="Calibri" panose="020F0502020204030204" pitchFamily="34" charset="0"/>
+            </a:endParaRPr>
+          </a:p>
+          <a:p>
+            <a:pPr>
+              <a:buFont typeface="Arial" panose="020B0604020202020204" pitchFamily="34" charset="0"/>
+              <a:buChar char="•"/>
             </a:pPr>
-            <a:endParaRPr lang="en-US" sz="2400" dirty="0"/>
+            <a:endParaRPr lang="en-US" sz="2400" dirty="0">
+              <a:latin typeface="Calibri" panose="020F0502020204030204" pitchFamily="34" charset="0"/>
+            </a:endParaRPr>
           </a:p>
         </p:txBody>
       </p:sp>
@@ -8019,7 +8085,7 @@
   <p:timing>
     <p:tnLst>
       <p:par>
-        <p:cTn xmlns:p14="http://schemas.microsoft.com/office/powerpoint/2010/main" id="1" dur="indefinite" restart="never" nodeType="tmRoot"/>
+        <p:cTn id="1" dur="indefinite" restart="never" nodeType="tmRoot"/>
       </p:par>
     </p:tnLst>
   </p:timing>
@@ -8059,10 +8125,14 @@
           <a:lstStyle/>
           <a:p>
             <a:r>
-              <a:rPr lang="en-US" dirty="0" smtClean="0"/>
+              <a:rPr lang="en-US" dirty="0" smtClean="0">
+                <a:latin typeface="Calibri" panose="020F0502020204030204" pitchFamily="34" charset="0"/>
+              </a:rPr>
               <a:t>Visibility</a:t>
             </a:r>
-            <a:endParaRPr lang="en-US" dirty="0"/>
+            <a:endParaRPr lang="en-US" dirty="0">
+              <a:latin typeface="Calibri" panose="020F0502020204030204" pitchFamily="34" charset="0"/>
+            </a:endParaRPr>
           </a:p>
         </p:txBody>
       </p:sp>
@@ -8083,81 +8153,136 @@
           </a:bodyPr>
           <a:lstStyle/>
           <a:p>
-            <a:r>
-              <a:rPr lang="en-US" sz="2000" dirty="0" smtClean="0"/>
+            <a:pPr>
+              <a:buFont typeface="Arial" panose="020B0604020202020204" pitchFamily="34" charset="0"/>
+              <a:buChar char="•"/>
+            </a:pPr>
+            <a:r>
+              <a:rPr lang="en-US" sz="2000" dirty="0" smtClean="0">
+                <a:latin typeface="Calibri" panose="020F0502020204030204" pitchFamily="34" charset="0"/>
+              </a:rPr>
               <a:t>Visibility constrained by field of view</a:t>
             </a:r>
           </a:p>
           <a:p>
-            <a:r>
-              <a:rPr lang="en-US" sz="2000" dirty="0" smtClean="0"/>
+            <a:pPr>
+              <a:buFont typeface="Arial" panose="020B0604020202020204" pitchFamily="34" charset="0"/>
+              <a:buChar char="•"/>
+            </a:pPr>
+            <a:r>
+              <a:rPr lang="en-US" sz="2000" dirty="0" smtClean="0">
+                <a:latin typeface="Calibri" panose="020F0502020204030204" pitchFamily="34" charset="0"/>
+              </a:rPr>
               <a:t>Also can be constrained by limited number of influencing neighbors</a:t>
             </a:r>
           </a:p>
           <a:p>
-            <a:r>
-              <a:rPr lang="en-US" sz="2000" dirty="0" smtClean="0"/>
+            <a:pPr>
+              <a:buFont typeface="Arial" panose="020B0604020202020204" pitchFamily="34" charset="0"/>
+              <a:buChar char="•"/>
+            </a:pPr>
+            <a:r>
+              <a:rPr lang="en-US" sz="2000" dirty="0" smtClean="0">
+                <a:latin typeface="Calibri" panose="020F0502020204030204" pitchFamily="34" charset="0"/>
+              </a:rPr>
               <a:t>Each unit is aware </a:t>
             </a:r>
             <a:r>
-              <a:rPr lang="en-US" sz="2000" dirty="0"/>
+              <a:rPr lang="en-US" sz="2000" dirty="0">
+                <a:latin typeface="Calibri" panose="020F0502020204030204" pitchFamily="34" charset="0"/>
+              </a:rPr>
               <a:t>of its </a:t>
             </a:r>
             <a:r>
-              <a:rPr lang="en-US" sz="2000" dirty="0" smtClean="0"/>
+              <a:rPr lang="en-US" sz="2000" dirty="0" smtClean="0">
+                <a:latin typeface="Calibri" panose="020F0502020204030204" pitchFamily="34" charset="0"/>
+              </a:rPr>
               <a:t>local</a:t>
             </a:r>
             <a:br>
-              <a:rPr lang="en-US" sz="2000" dirty="0" smtClean="0"/>
+              <a:rPr lang="en-US" sz="2000" dirty="0" smtClean="0">
+                <a:latin typeface="Calibri" panose="020F0502020204030204" pitchFamily="34" charset="0"/>
+              </a:rPr>
             </a:br>
             <a:r>
-              <a:rPr lang="en-US" sz="2000" dirty="0" smtClean="0"/>
+              <a:rPr lang="en-US" sz="2000" dirty="0" smtClean="0">
+                <a:latin typeface="Calibri" panose="020F0502020204030204" pitchFamily="34" charset="0"/>
+              </a:rPr>
               <a:t>surroundings</a:t>
             </a:r>
-            <a:endParaRPr lang="en-US" sz="2000" dirty="0"/>
-          </a:p>
-          <a:p>
-            <a:r>
-              <a:rPr lang="en-US" sz="2000" dirty="0"/>
+            <a:endParaRPr lang="en-US" sz="2000" dirty="0">
+              <a:latin typeface="Calibri" panose="020F0502020204030204" pitchFamily="34" charset="0"/>
+            </a:endParaRPr>
+          </a:p>
+          <a:p>
+            <a:pPr>
+              <a:buFont typeface="Arial" panose="020B0604020202020204" pitchFamily="34" charset="0"/>
+              <a:buChar char="•"/>
+            </a:pPr>
+            <a:r>
+              <a:rPr lang="en-US" sz="2000" dirty="0">
+                <a:latin typeface="Calibri" panose="020F0502020204030204" pitchFamily="34" charset="0"/>
+              </a:rPr>
               <a:t>Each unit does not necessarily </a:t>
             </a:r>
             <a:r>
-              <a:rPr lang="en-US" sz="2000" dirty="0" smtClean="0"/>
+              <a:rPr lang="en-US" sz="2000" dirty="0" smtClean="0">
+                <a:latin typeface="Calibri" panose="020F0502020204030204" pitchFamily="34" charset="0"/>
+              </a:rPr>
               <a:t>know</a:t>
             </a:r>
             <a:br>
-              <a:rPr lang="en-US" sz="2000" dirty="0" smtClean="0"/>
+              <a:rPr lang="en-US" sz="2000" dirty="0" smtClean="0">
+                <a:latin typeface="Calibri" panose="020F0502020204030204" pitchFamily="34" charset="0"/>
+              </a:rPr>
             </a:br>
             <a:r>
-              <a:rPr lang="en-US" sz="2000" dirty="0" smtClean="0"/>
+              <a:rPr lang="en-US" sz="2000" dirty="0" smtClean="0">
+                <a:latin typeface="Calibri" panose="020F0502020204030204" pitchFamily="34" charset="0"/>
+              </a:rPr>
               <a:t>what the </a:t>
             </a:r>
             <a:r>
-              <a:rPr lang="en-US" sz="2000" dirty="0"/>
+              <a:rPr lang="en-US" sz="2000" dirty="0">
+                <a:latin typeface="Calibri" panose="020F0502020204030204" pitchFamily="34" charset="0"/>
+              </a:rPr>
               <a:t>entire group is doing at </a:t>
             </a:r>
             <a:r>
-              <a:rPr lang="en-US" sz="2000" dirty="0" smtClean="0"/>
+              <a:rPr lang="en-US" sz="2000" dirty="0" smtClean="0">
+                <a:latin typeface="Calibri" panose="020F0502020204030204" pitchFamily="34" charset="0"/>
+              </a:rPr>
               <a:t>any</a:t>
             </a:r>
             <a:br>
-              <a:rPr lang="en-US" sz="2000" dirty="0" smtClean="0"/>
+              <a:rPr lang="en-US" sz="2000" dirty="0" smtClean="0">
+                <a:latin typeface="Calibri" panose="020F0502020204030204" pitchFamily="34" charset="0"/>
+              </a:rPr>
             </a:br>
             <a:r>
-              <a:rPr lang="en-US" sz="2000" dirty="0" smtClean="0"/>
+              <a:rPr lang="en-US" sz="2000" dirty="0" smtClean="0">
+                <a:latin typeface="Calibri" panose="020F0502020204030204" pitchFamily="34" charset="0"/>
+              </a:rPr>
               <a:t>given </a:t>
             </a:r>
             <a:r>
-              <a:rPr lang="en-US" sz="2000" dirty="0"/>
+              <a:rPr lang="en-US" sz="2000" dirty="0">
+                <a:latin typeface="Calibri" panose="020F0502020204030204" pitchFamily="34" charset="0"/>
+              </a:rPr>
               <a:t>time</a:t>
             </a:r>
-            <a:endParaRPr lang="en-MY" sz="2000" dirty="0"/>
-          </a:p>
-          <a:p>
-            <a:pPr marL="0" indent="0">
-              <a:buNone/>
+            <a:endParaRPr lang="en-MY" sz="2000" dirty="0">
+              <a:latin typeface="Calibri" panose="020F0502020204030204" pitchFamily="34" charset="0"/>
+            </a:endParaRPr>
+          </a:p>
+          <a:p>
+            <a:pPr>
+              <a:buFont typeface="Arial" panose="020B0604020202020204" pitchFamily="34" charset="0"/>
+              <a:buChar char="•"/>
             </a:pPr>
-            <a:endParaRPr lang="en-US" sz="2000" dirty="0"/>
+            <a:endParaRPr lang="en-US" sz="2000" dirty="0">
+              <a:latin typeface="Calibri" panose="020F0502020204030204" pitchFamily="34" charset="0"/>
+            </a:endParaRPr>
           </a:p>
         </p:txBody>
       </p:sp>
@@ -8210,7 +8335,7 @@
   <p:timing>
     <p:tnLst>
       <p:par>
-        <p:cTn xmlns:p14="http://schemas.microsoft.com/office/powerpoint/2010/main" id="1" dur="indefinite" restart="never" nodeType="tmRoot"/>
+        <p:cTn id="1" dur="indefinite" restart="never" nodeType="tmRoot"/>
       </p:par>
     </p:tnLst>
   </p:timing>
@@ -8250,10 +8375,14 @@
           <a:lstStyle/>
           <a:p>
             <a:r>
-              <a:rPr lang="en-US" dirty="0" smtClean="0"/>
+              <a:rPr lang="en-US" dirty="0" smtClean="0">
+                <a:latin typeface="Calibri" panose="020F0502020204030204" pitchFamily="34" charset="0"/>
+              </a:rPr>
               <a:t>Other Extensions</a:t>
             </a:r>
-            <a:endParaRPr lang="en-US" dirty="0"/>
+            <a:endParaRPr lang="en-US" dirty="0">
+              <a:latin typeface="Calibri" panose="020F0502020204030204" pitchFamily="34" charset="0"/>
+            </a:endParaRPr>
           </a:p>
         </p:txBody>
       </p:sp>
@@ -8274,29 +8403,55 @@
           </a:bodyPr>
           <a:lstStyle/>
           <a:p>
-            <a:r>
-              <a:rPr lang="en-US" sz="2400" dirty="0" smtClean="0"/>
+            <a:pPr>
+              <a:buFont typeface="Arial" panose="020B0604020202020204" pitchFamily="34" charset="0"/>
+              <a:buChar char="•"/>
+            </a:pPr>
+            <a:r>
+              <a:rPr lang="en-US" sz="2400" dirty="0" smtClean="0">
+                <a:latin typeface="Calibri" panose="020F0502020204030204" pitchFamily="34" charset="0"/>
+              </a:rPr>
               <a:t>Avoiding obstacles</a:t>
             </a:r>
           </a:p>
           <a:p>
-            <a:r>
-              <a:rPr lang="en-US" sz="2400" dirty="0" smtClean="0"/>
+            <a:pPr>
+              <a:buFont typeface="Arial" panose="020B0604020202020204" pitchFamily="34" charset="0"/>
+              <a:buChar char="•"/>
+            </a:pPr>
+            <a:r>
+              <a:rPr lang="en-US" sz="2400" dirty="0" smtClean="0">
+                <a:latin typeface="Calibri" panose="020F0502020204030204" pitchFamily="34" charset="0"/>
+              </a:rPr>
               <a:t>Avoiding predators</a:t>
             </a:r>
           </a:p>
           <a:p>
-            <a:r>
-              <a:rPr lang="en-US" sz="2400" dirty="0" smtClean="0"/>
+            <a:pPr>
+              <a:buFont typeface="Arial" panose="020B0604020202020204" pitchFamily="34" charset="0"/>
+              <a:buChar char="•"/>
+            </a:pPr>
+            <a:r>
+              <a:rPr lang="en-US" sz="2400" dirty="0" smtClean="0">
+                <a:latin typeface="Calibri" panose="020F0502020204030204" pitchFamily="34" charset="0"/>
+              </a:rPr>
               <a:t>Following leaders</a:t>
             </a:r>
           </a:p>
           <a:p>
-            <a:r>
-              <a:rPr lang="en-US" sz="2400" dirty="0" smtClean="0"/>
-              <a:t>Making specific formations</a:t>
-            </a:r>
-            <a:endParaRPr lang="en-US" sz="2400" dirty="0"/>
+            <a:pPr>
+              <a:buFont typeface="Arial" panose="020B0604020202020204" pitchFamily="34" charset="0"/>
+              <a:buChar char="•"/>
+            </a:pPr>
+            <a:r>
+              <a:rPr lang="en-US" sz="2400" dirty="0" smtClean="0">
+                <a:latin typeface="Calibri" panose="020F0502020204030204" pitchFamily="34" charset="0"/>
+              </a:rPr>
+              <a:t>Making specific formations (circle, “flying V,” etc.)</a:t>
+            </a:r>
+            <a:endParaRPr lang="en-US" sz="2400" dirty="0">
+              <a:latin typeface="Calibri" panose="020F0502020204030204" pitchFamily="34" charset="0"/>
+            </a:endParaRPr>
           </a:p>
         </p:txBody>
       </p:sp>
@@ -8313,7 +8468,7 @@
   <p:timing>
     <p:tnLst>
       <p:par>
-        <p:cTn xmlns:p14="http://schemas.microsoft.com/office/powerpoint/2010/main" id="1" dur="indefinite" restart="never" nodeType="tmRoot"/>
+        <p:cTn id="1" dur="indefinite" restart="never" nodeType="tmRoot"/>
       </p:par>
     </p:tnLst>
   </p:timing>
@@ -8353,10 +8508,14 @@
           <a:lstStyle/>
           <a:p>
             <a:r>
-              <a:rPr lang="en-US" dirty="0" smtClean="0"/>
+              <a:rPr lang="en-US" dirty="0" smtClean="0">
+                <a:latin typeface="Calibri" panose="020F0502020204030204" pitchFamily="34" charset="0"/>
+              </a:rPr>
               <a:t>Implementation</a:t>
             </a:r>
-            <a:endParaRPr lang="en-US" dirty="0"/>
+            <a:endParaRPr lang="en-US" dirty="0">
+              <a:latin typeface="Calibri" panose="020F0502020204030204" pitchFamily="34" charset="0"/>
+            </a:endParaRPr>
           </a:p>
         </p:txBody>
       </p:sp>
@@ -8377,51 +8536,85 @@
           </a:bodyPr>
           <a:lstStyle/>
           <a:p>
-            <a:r>
-              <a:rPr lang="en-US" sz="2400" dirty="0"/>
+            <a:pPr>
+              <a:buFont typeface="Arial" panose="020B0604020202020204" pitchFamily="34" charset="0"/>
+              <a:buChar char="•"/>
+            </a:pPr>
+            <a:r>
+              <a:rPr lang="en-US" sz="2400" dirty="0">
+                <a:latin typeface="Calibri" panose="020F0502020204030204" pitchFamily="34" charset="0"/>
+              </a:rPr>
               <a:t>In each game loop</a:t>
             </a:r>
           </a:p>
           <a:p>
-            <a:pPr lvl="1"/>
-            <a:r>
-              <a:rPr lang="en-US" sz="2000" dirty="0"/>
+            <a:pPr lvl="1">
+              <a:buFont typeface="Arial" panose="020B0604020202020204" pitchFamily="34" charset="0"/>
+              <a:buChar char="•"/>
+            </a:pPr>
+            <a:r>
+              <a:rPr lang="en-US" sz="2000" dirty="0">
+                <a:latin typeface="Calibri" panose="020F0502020204030204" pitchFamily="34" charset="0"/>
+              </a:rPr>
               <a:t>Cycle </a:t>
             </a:r>
             <a:r>
-              <a:rPr lang="en-US" sz="2000" dirty="0" smtClean="0"/>
+              <a:rPr lang="en-US" sz="2000" dirty="0" smtClean="0">
+                <a:latin typeface="Calibri" panose="020F0502020204030204" pitchFamily="34" charset="0"/>
+              </a:rPr>
               <a:t>through all </a:t>
             </a:r>
             <a:r>
-              <a:rPr lang="en-US" sz="2000" dirty="0"/>
+              <a:rPr lang="en-US" sz="2000" dirty="0">
+                <a:latin typeface="Calibri" panose="020F0502020204030204" pitchFamily="34" charset="0"/>
+              </a:rPr>
               <a:t>units in the flock to acquire data (direction, speed, etc.) from unit’s neighbors</a:t>
             </a:r>
           </a:p>
           <a:p>
-            <a:pPr lvl="1"/>
-            <a:r>
-              <a:rPr lang="en-US" sz="2000" dirty="0"/>
+            <a:pPr lvl="1">
+              <a:buFont typeface="Arial" panose="020B0604020202020204" pitchFamily="34" charset="0"/>
+              <a:buChar char="•"/>
+            </a:pPr>
+            <a:r>
+              <a:rPr lang="en-US" sz="2000" dirty="0">
+                <a:latin typeface="Calibri" panose="020F0502020204030204" pitchFamily="34" charset="0"/>
+              </a:rPr>
               <a:t>For each unit, update with net steering force from the three rules</a:t>
             </a:r>
           </a:p>
           <a:p>
-            <a:r>
-              <a:rPr lang="en-US" sz="2400" dirty="0"/>
+            <a:pPr>
+              <a:buFont typeface="Arial" panose="020B0604020202020204" pitchFamily="34" charset="0"/>
+              <a:buChar char="•"/>
+            </a:pPr>
+            <a:r>
+              <a:rPr lang="en-US" sz="2400" dirty="0">
+                <a:latin typeface="Calibri" panose="020F0502020204030204" pitchFamily="34" charset="0"/>
+              </a:rPr>
               <a:t>Each unit must update its </a:t>
             </a:r>
             <a:r>
-              <a:rPr lang="en-US" sz="2400" dirty="0" smtClean="0"/>
+              <a:rPr lang="en-US" sz="2400" dirty="0" smtClean="0">
+                <a:latin typeface="Calibri" panose="020F0502020204030204" pitchFamily="34" charset="0"/>
+              </a:rPr>
               <a:t>list of current neighbors each </a:t>
             </a:r>
             <a:r>
-              <a:rPr lang="en-US" sz="2400" dirty="0"/>
+              <a:rPr lang="en-US" sz="2400" dirty="0">
+                <a:latin typeface="Calibri" panose="020F0502020204030204" pitchFamily="34" charset="0"/>
+              </a:rPr>
               <a:t>game </a:t>
             </a:r>
             <a:r>
-              <a:rPr lang="en-US" sz="2400" dirty="0" smtClean="0"/>
+              <a:rPr lang="en-US" sz="2400" dirty="0" smtClean="0">
+                <a:latin typeface="Calibri" panose="020F0502020204030204" pitchFamily="34" charset="0"/>
+              </a:rPr>
               <a:t>loop</a:t>
             </a:r>
-            <a:endParaRPr lang="en-US" sz="2400" dirty="0"/>
+            <a:endParaRPr lang="en-US" sz="2400" dirty="0">
+              <a:latin typeface="Calibri" panose="020F0502020204030204" pitchFamily="34" charset="0"/>
+            </a:endParaRPr>
           </a:p>
         </p:txBody>
       </p:sp>
@@ -8438,7 +8631,7 @@
   <p:timing>
     <p:tnLst>
       <p:par>
-        <p:cTn xmlns:p14="http://schemas.microsoft.com/office/powerpoint/2010/main" id="1" dur="indefinite" restart="never" nodeType="tmRoot"/>
+        <p:cTn id="1" dur="indefinite" restart="never" nodeType="tmRoot"/>
       </p:par>
     </p:tnLst>
   </p:timing>
@@ -8478,10 +8671,14 @@
           <a:lstStyle/>
           <a:p>
             <a:r>
-              <a:rPr lang="en-US" dirty="0" smtClean="0"/>
+              <a:rPr lang="en-US" dirty="0" smtClean="0">
+                <a:latin typeface="Calibri" panose="020F0502020204030204" pitchFamily="34" charset="0"/>
+              </a:rPr>
               <a:t>Cohesion Implementation</a:t>
             </a:r>
-            <a:endParaRPr lang="en-US" dirty="0"/>
+            <a:endParaRPr lang="en-US" dirty="0">
+              <a:latin typeface="Calibri" panose="020F0502020204030204" pitchFamily="34" charset="0"/>
+            </a:endParaRPr>
           </a:p>
         </p:txBody>
       </p:sp>
@@ -8502,59 +8699,97 @@
           </a:bodyPr>
           <a:lstStyle/>
           <a:p>
-            <a:r>
-              <a:rPr lang="en-US" sz="2400" dirty="0"/>
+            <a:pPr>
+              <a:buFont typeface="Arial" panose="020B0604020202020204" pitchFamily="34" charset="0"/>
+              <a:buChar char="•"/>
+            </a:pPr>
+            <a:r>
+              <a:rPr lang="en-US" sz="2400" dirty="0">
+                <a:latin typeface="Calibri" panose="020F0502020204030204" pitchFamily="34" charset="0"/>
+              </a:rPr>
               <a:t>Calculate </a:t>
             </a:r>
             <a:r>
-              <a:rPr lang="en-US" sz="2400" b="1" dirty="0"/>
+              <a:rPr lang="en-US" sz="2400" b="1" dirty="0">
+                <a:latin typeface="Calibri" panose="020F0502020204030204" pitchFamily="34" charset="0"/>
+              </a:rPr>
               <a:t>average position </a:t>
             </a:r>
             <a:r>
-              <a:rPr lang="en-US" sz="2400" dirty="0"/>
+              <a:rPr lang="en-US" sz="2400" dirty="0">
+                <a:latin typeface="Calibri" panose="020F0502020204030204" pitchFamily="34" charset="0"/>
+              </a:rPr>
               <a:t>– vector sum of </a:t>
             </a:r>
             <a:r>
-              <a:rPr lang="en-US" sz="2400" dirty="0" smtClean="0"/>
+              <a:rPr lang="en-US" sz="2400" dirty="0" smtClean="0">
+                <a:latin typeface="Calibri" panose="020F0502020204030204" pitchFamily="34" charset="0"/>
+              </a:rPr>
               <a:t>neighbors’ respective </a:t>
             </a:r>
             <a:r>
-              <a:rPr lang="en-US" sz="2400" dirty="0"/>
+              <a:rPr lang="en-US" sz="2400" dirty="0">
+                <a:latin typeface="Calibri" panose="020F0502020204030204" pitchFamily="34" charset="0"/>
+              </a:rPr>
               <a:t>positions divided by total number of neighbors</a:t>
             </a:r>
           </a:p>
           <a:p>
-            <a:r>
-              <a:rPr lang="en-US" sz="2400" dirty="0"/>
+            <a:pPr>
+              <a:buFont typeface="Arial" panose="020B0604020202020204" pitchFamily="34" charset="0"/>
+              <a:buChar char="•"/>
+            </a:pPr>
+            <a:r>
+              <a:rPr lang="en-US" sz="2400" dirty="0">
+                <a:latin typeface="Calibri" panose="020F0502020204030204" pitchFamily="34" charset="0"/>
+              </a:rPr>
               <a:t>Determine direction to turn and angle to steer towards</a:t>
             </a:r>
           </a:p>
           <a:p>
-            <a:r>
-              <a:rPr lang="en-US" sz="2400" dirty="0"/>
+            <a:pPr>
+              <a:buFont typeface="Arial" panose="020B0604020202020204" pitchFamily="34" charset="0"/>
+              <a:buChar char="•"/>
+            </a:pPr>
+            <a:r>
+              <a:rPr lang="en-US" sz="2400" dirty="0">
+                <a:latin typeface="Calibri" panose="020F0502020204030204" pitchFamily="34" charset="0"/>
+              </a:rPr>
               <a:t>Steering force </a:t>
             </a:r>
             <a:r>
-              <a:rPr lang="en-US" sz="2400" dirty="0" smtClean="0"/>
+              <a:rPr lang="en-US" sz="2400" dirty="0" smtClean="0">
+                <a:latin typeface="Calibri" panose="020F0502020204030204" pitchFamily="34" charset="0"/>
+              </a:rPr>
               <a:t>= (direction) * (steering force) </a:t>
             </a:r>
             <a:r>
-              <a:rPr lang="en-US" sz="2400" dirty="0"/>
+              <a:rPr lang="en-US" sz="2400" dirty="0">
+                <a:latin typeface="Calibri" panose="020F0502020204030204" pitchFamily="34" charset="0"/>
+              </a:rPr>
               <a:t>* </a:t>
             </a:r>
             <a:r>
-              <a:rPr lang="en-US" sz="2400" dirty="0" smtClean="0"/>
+              <a:rPr lang="en-US" sz="2400" dirty="0" smtClean="0">
+                <a:latin typeface="Calibri" panose="020F0502020204030204" pitchFamily="34" charset="0"/>
+              </a:rPr>
               <a:t>(angle </a:t>
             </a:r>
             <a:r>
-              <a:rPr lang="en-US" sz="2400" dirty="0"/>
+              <a:rPr lang="en-US" sz="2400" dirty="0">
+                <a:latin typeface="Calibri" panose="020F0502020204030204" pitchFamily="34" charset="0"/>
+              </a:rPr>
               <a:t>of </a:t>
             </a:r>
             <a:r>
-              <a:rPr lang="en-US" sz="2400" dirty="0" smtClean="0"/>
+              <a:rPr lang="en-US" sz="2400" dirty="0" smtClean="0">
+                <a:latin typeface="Calibri" panose="020F0502020204030204" pitchFamily="34" charset="0"/>
+              </a:rPr>
               <a:t>steering)</a:t>
             </a:r>
-            <a:endParaRPr lang="en-US" sz="2400" dirty="0"/>
+            <a:endParaRPr lang="en-US" sz="2400" dirty="0">
+              <a:latin typeface="Calibri" panose="020F0502020204030204" pitchFamily="34" charset="0"/>
+            </a:endParaRPr>
           </a:p>
         </p:txBody>
       </p:sp>
@@ -8571,7 +8806,7 @@
   <p:timing>
     <p:tnLst>
       <p:par>
-        <p:cTn xmlns:p14="http://schemas.microsoft.com/office/powerpoint/2010/main" id="1" dur="indefinite" restart="never" nodeType="tmRoot"/>
+        <p:cTn id="1" dur="indefinite" restart="never" nodeType="tmRoot"/>
       </p:par>
     </p:tnLst>
   </p:timing>
@@ -8611,17 +8846,147 @@
           <a:lstStyle/>
           <a:p>
             <a:r>
-              <a:rPr lang="en-US" dirty="0" smtClean="0"/>
-              <a:t>Cohesion Implementation – Example</a:t>
-            </a:r>
-            <a:endParaRPr lang="en-US" dirty="0"/>
+              <a:rPr lang="en-US" dirty="0" smtClean="0">
+                <a:latin typeface="Calibri" panose="020F0502020204030204" pitchFamily="34" charset="0"/>
+              </a:rPr>
+              <a:t>Alignment Implementation</a:t>
+            </a:r>
+            <a:endParaRPr lang="en-US" dirty="0">
+              <a:latin typeface="Calibri" panose="020F0502020204030204" pitchFamily="34" charset="0"/>
+            </a:endParaRPr>
+          </a:p>
+        </p:txBody>
+      </p:sp>
+      <p:sp>
+        <p:nvSpPr>
+          <p:cNvPr id="3" name="Content Placeholder 2"/>
+          <p:cNvSpPr>
+            <a:spLocks noGrp="1"/>
+          </p:cNvSpPr>
+          <p:nvPr>
+            <p:ph idx="1"/>
+          </p:nvPr>
+        </p:nvSpPr>
+        <p:spPr/>
+        <p:txBody>
+          <a:bodyPr>
+            <a:normAutofit/>
+          </a:bodyPr>
+          <a:lstStyle/>
+          <a:p>
+            <a:pPr>
+              <a:buFont typeface="Arial" panose="020B0604020202020204" pitchFamily="34" charset="0"/>
+              <a:buChar char="•"/>
+            </a:pPr>
+            <a:r>
+              <a:rPr lang="en-US" sz="2400" dirty="0">
+                <a:latin typeface="Calibri" panose="020F0502020204030204" pitchFamily="34" charset="0"/>
+              </a:rPr>
+              <a:t>Calculate </a:t>
+            </a:r>
+            <a:r>
+              <a:rPr lang="en-US" sz="2400" b="1" dirty="0">
+                <a:latin typeface="Calibri" panose="020F0502020204030204" pitchFamily="34" charset="0"/>
+              </a:rPr>
+              <a:t>average </a:t>
+            </a:r>
+            <a:r>
+              <a:rPr lang="en-US" sz="2400" b="1" dirty="0" smtClean="0">
+                <a:latin typeface="Calibri" panose="020F0502020204030204" pitchFamily="34" charset="0"/>
+              </a:rPr>
+              <a:t>heading </a:t>
+            </a:r>
+            <a:r>
+              <a:rPr lang="en-US" sz="2400" dirty="0">
+                <a:latin typeface="Calibri" panose="020F0502020204030204" pitchFamily="34" charset="0"/>
+              </a:rPr>
+              <a:t>– vector sum of </a:t>
+            </a:r>
+            <a:r>
+              <a:rPr lang="en-US" sz="2400" dirty="0" smtClean="0">
+                <a:latin typeface="Calibri" panose="020F0502020204030204" pitchFamily="34" charset="0"/>
+              </a:rPr>
+              <a:t>neighbors’ respective alignments divided </a:t>
+            </a:r>
+            <a:r>
+              <a:rPr lang="en-US" sz="2400" dirty="0">
+                <a:latin typeface="Calibri" panose="020F0502020204030204" pitchFamily="34" charset="0"/>
+              </a:rPr>
+              <a:t>by total number of neighbors</a:t>
+            </a:r>
+          </a:p>
+          <a:p>
+            <a:pPr>
+              <a:buFont typeface="Arial" panose="020B0604020202020204" pitchFamily="34" charset="0"/>
+              <a:buChar char="•"/>
+            </a:pPr>
+            <a:r>
+              <a:rPr lang="en-US" sz="2400" dirty="0">
+                <a:latin typeface="Calibri" panose="020F0502020204030204" pitchFamily="34" charset="0"/>
+              </a:rPr>
+              <a:t>Determine direction to turn and angle to steer towards</a:t>
+            </a:r>
+          </a:p>
+          <a:p>
+            <a:pPr>
+              <a:buFont typeface="Arial" panose="020B0604020202020204" pitchFamily="34" charset="0"/>
+              <a:buChar char="•"/>
+            </a:pPr>
+            <a:r>
+              <a:rPr lang="en-US" sz="2400" dirty="0">
+                <a:latin typeface="Calibri" panose="020F0502020204030204" pitchFamily="34" charset="0"/>
+              </a:rPr>
+              <a:t>Steering force </a:t>
+            </a:r>
+            <a:r>
+              <a:rPr lang="en-US" sz="2400" dirty="0" smtClean="0">
+                <a:latin typeface="Calibri" panose="020F0502020204030204" pitchFamily="34" charset="0"/>
+              </a:rPr>
+              <a:t>= (direction) * (steering force) </a:t>
+            </a:r>
+            <a:r>
+              <a:rPr lang="en-US" sz="2400" dirty="0">
+                <a:latin typeface="Calibri" panose="020F0502020204030204" pitchFamily="34" charset="0"/>
+              </a:rPr>
+              <a:t>* </a:t>
+            </a:r>
+            <a:r>
+              <a:rPr lang="en-US" sz="2400" dirty="0" smtClean="0">
+                <a:latin typeface="Calibri" panose="020F0502020204030204" pitchFamily="34" charset="0"/>
+              </a:rPr>
+              <a:t>(angle </a:t>
+            </a:r>
+            <a:r>
+              <a:rPr lang="en-US" sz="2400" dirty="0">
+                <a:latin typeface="Calibri" panose="020F0502020204030204" pitchFamily="34" charset="0"/>
+              </a:rPr>
+              <a:t>of </a:t>
+            </a:r>
+            <a:r>
+              <a:rPr lang="en-US" sz="2400" dirty="0" smtClean="0">
+                <a:latin typeface="Calibri" panose="020F0502020204030204" pitchFamily="34" charset="0"/>
+              </a:rPr>
+              <a:t>steering)</a:t>
+            </a:r>
+            <a:endParaRPr lang="en-US" sz="2400" dirty="0">
+              <a:latin typeface="Calibri" panose="020F0502020204030204" pitchFamily="34" charset="0"/>
+            </a:endParaRPr>
+          </a:p>
+          <a:p>
+            <a:pPr>
+              <a:buFont typeface="Arial" panose="020B0604020202020204" pitchFamily="34" charset="0"/>
+              <a:buChar char="•"/>
+            </a:pPr>
+            <a:endParaRPr lang="en-US" sz="2400" dirty="0">
+              <a:latin typeface="Calibri" panose="020F0502020204030204" pitchFamily="34" charset="0"/>
+            </a:endParaRPr>
           </a:p>
         </p:txBody>
       </p:sp>
     </p:spTree>
     <p:extLst>
       <p:ext uri="{BB962C8B-B14F-4D97-AF65-F5344CB8AC3E}">
-        <p14:creationId xmlns:p14="http://schemas.microsoft.com/office/powerpoint/2010/main" val="3469114784"/>
+        <p14:creationId xmlns:p14="http://schemas.microsoft.com/office/powerpoint/2010/main" val="85653956"/>
       </p:ext>
     </p:extLst>
   </p:cSld>
@@ -8631,7 +8996,7 @@
   <p:timing>
     <p:tnLst>
       <p:par>
-        <p:cTn xmlns:p14="http://schemas.microsoft.com/office/powerpoint/2010/main" id="1" dur="indefinite" restart="never" nodeType="tmRoot"/>
+        <p:cTn id="1" dur="indefinite" restart="never" nodeType="tmRoot"/>
       </p:par>
     </p:tnLst>
   </p:timing>
@@ -8671,10 +9036,14 @@
           <a:lstStyle/>
           <a:p>
             <a:r>
-              <a:rPr lang="en-US" dirty="0" smtClean="0"/>
-              <a:t>Alignment Implementation</a:t>
-            </a:r>
-            <a:endParaRPr lang="en-US" dirty="0"/>
+              <a:rPr lang="en-US" dirty="0" smtClean="0">
+                <a:latin typeface="Calibri" panose="020F0502020204030204" pitchFamily="34" charset="0"/>
+              </a:rPr>
+              <a:t>Separation Implementation</a:t>
+            </a:r>
+            <a:endParaRPr lang="en-US" dirty="0">
+              <a:latin typeface="Calibri" panose="020F0502020204030204" pitchFamily="34" charset="0"/>
+            </a:endParaRPr>
           </a:p>
         </p:txBody>
       </p:sp>
@@ -8695,73 +9064,98 @@
           </a:bodyPr>
           <a:lstStyle/>
           <a:p>
-            <a:r>
-              <a:rPr lang="en-US" sz="2400" dirty="0"/>
-              <a:t>Calculate </a:t>
-            </a:r>
-            <a:r>
-              <a:rPr lang="en-US" sz="2400" b="1" dirty="0"/>
-              <a:t>average </a:t>
-            </a:r>
-            <a:r>
-              <a:rPr lang="en-US" sz="2400" b="1" dirty="0" smtClean="0"/>
-              <a:t>heading </a:t>
-            </a:r>
-            <a:r>
-              <a:rPr lang="en-US" sz="2400" dirty="0"/>
-              <a:t>– vector sum of </a:t>
-            </a:r>
-            <a:r>
-              <a:rPr lang="en-US" sz="2400" dirty="0" smtClean="0"/>
-              <a:t>neighbors’ respective alignments divided </a:t>
-            </a:r>
-            <a:r>
-              <a:rPr lang="en-US" sz="2400" dirty="0"/>
-              <a:t>by total number of neighbors</a:t>
-            </a:r>
-          </a:p>
-          <a:p>
-            <a:r>
-              <a:rPr lang="en-US" sz="2400" dirty="0"/>
-              <a:t>Determine direction to turn and angle to steer towards</a:t>
-            </a:r>
-          </a:p>
-          <a:p>
-            <a:r>
-              <a:rPr lang="en-US" sz="2400" dirty="0"/>
-              <a:t>Steering force </a:t>
-            </a:r>
-            <a:r>
-              <a:rPr lang="en-US" sz="2400" dirty="0" smtClean="0"/>
-              <a:t>= (direction) * (steering force) </a:t>
-            </a:r>
-            <a:r>
-              <a:rPr lang="en-US" sz="2400" dirty="0"/>
+            <a:pPr>
+              <a:buFont typeface="Arial" panose="020B0604020202020204" pitchFamily="34" charset="0"/>
+              <a:buChar char="•"/>
+            </a:pPr>
+            <a:r>
+              <a:rPr lang="en-US" sz="2000" dirty="0" smtClean="0">
+                <a:latin typeface="Calibri" panose="020F0502020204030204" pitchFamily="34" charset="0"/>
+              </a:rPr>
+              <a:t>Steer </a:t>
+            </a:r>
+            <a:r>
+              <a:rPr lang="en-US" sz="2000" dirty="0">
+                <a:latin typeface="Calibri" panose="020F0502020204030204" pitchFamily="34" charset="0"/>
+              </a:rPr>
+              <a:t>away from any neighbor that is within view AND within prescribed minimum separation </a:t>
+            </a:r>
+            <a:r>
+              <a:rPr lang="en-US" sz="2000" dirty="0" smtClean="0">
+                <a:latin typeface="Calibri" panose="020F0502020204030204" pitchFamily="34" charset="0"/>
+              </a:rPr>
+              <a:t>distance (i.e., too close)</a:t>
+            </a:r>
+            <a:endParaRPr lang="en-MY" sz="2000" dirty="0">
+              <a:latin typeface="Calibri" panose="020F0502020204030204" pitchFamily="34" charset="0"/>
+            </a:endParaRPr>
+          </a:p>
+          <a:p>
+            <a:pPr>
+              <a:buFont typeface="Arial" panose="020B0604020202020204" pitchFamily="34" charset="0"/>
+              <a:buChar char="•"/>
+            </a:pPr>
+            <a:r>
+              <a:rPr lang="en-US" sz="2000" dirty="0">
+                <a:latin typeface="Calibri" panose="020F0502020204030204" pitchFamily="34" charset="0"/>
+              </a:rPr>
+              <a:t>Because this steering force is corrective, direction multiplier goes the opposite </a:t>
+            </a:r>
+            <a:r>
+              <a:rPr lang="en-US" sz="2000" dirty="0" smtClean="0">
+                <a:latin typeface="Calibri" panose="020F0502020204030204" pitchFamily="34" charset="0"/>
+              </a:rPr>
+              <a:t>way</a:t>
+            </a:r>
+          </a:p>
+          <a:p>
+            <a:pPr>
+              <a:buFont typeface="Arial" panose="020B0604020202020204" pitchFamily="34" charset="0"/>
+              <a:buChar char="•"/>
+            </a:pPr>
+            <a:r>
+              <a:rPr lang="en-US" sz="2000" dirty="0" smtClean="0">
+                <a:latin typeface="Calibri" panose="020F0502020204030204" pitchFamily="34" charset="0"/>
+              </a:rPr>
+              <a:t>Separation factor can be used to increase force with smaller separations</a:t>
+            </a:r>
+            <a:endParaRPr lang="en-US" sz="2000" dirty="0">
+              <a:latin typeface="Calibri" panose="020F0502020204030204" pitchFamily="34" charset="0"/>
+            </a:endParaRPr>
+          </a:p>
+          <a:p>
+            <a:pPr>
+              <a:buFont typeface="Arial" panose="020B0604020202020204" pitchFamily="34" charset="0"/>
+              <a:buChar char="•"/>
+            </a:pPr>
+            <a:r>
+              <a:rPr lang="en-US" sz="2000" dirty="0" smtClean="0">
+                <a:latin typeface="Calibri" panose="020F0502020204030204" pitchFamily="34" charset="0"/>
+              </a:rPr>
+              <a:t>Steering force = (direction) * (steering force) </a:t>
+            </a:r>
+            <a:r>
+              <a:rPr lang="en-US" sz="2000" dirty="0">
+                <a:latin typeface="Calibri" panose="020F0502020204030204" pitchFamily="34" charset="0"/>
+              </a:rPr>
               <a:t>* </a:t>
             </a:r>
             <a:r>
-              <a:rPr lang="en-US" sz="2400" dirty="0" smtClean="0"/>
-              <a:t>(angle </a:t>
-            </a:r>
-            <a:r>
-              <a:rPr lang="en-US" sz="2400" dirty="0"/>
-              <a:t>of </a:t>
-            </a:r>
-            <a:r>
-              <a:rPr lang="en-US" sz="2400" dirty="0" smtClean="0"/>
-              <a:t>steering)</a:t>
-            </a:r>
-            <a:endParaRPr lang="en-US" sz="2400" dirty="0"/>
-          </a:p>
-          <a:p>
-            <a:endParaRPr lang="en-US" sz="2400" dirty="0"/>
+              <a:rPr lang="en-US" sz="2000" dirty="0" smtClean="0">
+                <a:latin typeface="Calibri" panose="020F0502020204030204" pitchFamily="34" charset="0"/>
+              </a:rPr>
+              <a:t>(separation factor)</a:t>
+            </a:r>
+            <a:endParaRPr lang="en-US" sz="2000" dirty="0">
+              <a:latin typeface="Calibri" panose="020F0502020204030204" pitchFamily="34" charset="0"/>
+            </a:endParaRPr>
           </a:p>
         </p:txBody>
       </p:sp>
     </p:spTree>
     <p:extLst>
       <p:ext uri="{BB962C8B-B14F-4D97-AF65-F5344CB8AC3E}">
-        <p14:creationId xmlns:p14="http://schemas.microsoft.com/office/powerpoint/2010/main" val="85653956"/>
+        <p14:creationId xmlns:p14="http://schemas.microsoft.com/office/powerpoint/2010/main" val="1255845839"/>
       </p:ext>
     </p:extLst>
   </p:cSld>
@@ -8771,7 +9165,7 @@
   <p:timing>
     <p:tnLst>
       <p:par>
-        <p:cTn xmlns:p14="http://schemas.microsoft.com/office/powerpoint/2010/main" id="1" dur="indefinite" restart="never" nodeType="tmRoot"/>
+        <p:cTn id="1" dur="indefinite" restart="never" nodeType="tmRoot"/>
       </p:par>
     </p:tnLst>
   </p:timing>
@@ -8807,21 +9201,94 @@
         </p:nvSpPr>
         <p:spPr/>
         <p:txBody>
+          <a:bodyPr>
+            <a:normAutofit/>
+          </a:bodyPr>
+          <a:lstStyle/>
+          <a:p>
+            <a:r>
+              <a:rPr lang="en-US" sz="3200" dirty="0" smtClean="0">
+                <a:latin typeface="Calibri" panose="020F0502020204030204" pitchFamily="34" charset="0"/>
+              </a:rPr>
+              <a:t>2D Flocking Demo (written by Nat in Python)</a:t>
+            </a:r>
+            <a:endParaRPr lang="en-US" sz="3200" dirty="0">
+              <a:latin typeface="Calibri" panose="020F0502020204030204" pitchFamily="34" charset="0"/>
+            </a:endParaRPr>
+          </a:p>
+        </p:txBody>
+      </p:sp>
+      <p:sp>
+        <p:nvSpPr>
+          <p:cNvPr id="3" name="Content Placeholder 2"/>
+          <p:cNvSpPr>
+            <a:spLocks noGrp="1"/>
+          </p:cNvSpPr>
+          <p:nvPr>
+            <p:ph idx="1"/>
+          </p:nvPr>
+        </p:nvSpPr>
+        <p:spPr/>
+        <p:txBody>
           <a:bodyPr/>
           <a:lstStyle/>
           <a:p>
-            <a:r>
-              <a:rPr lang="en-US" dirty="0" smtClean="0"/>
-              <a:t>Alignment Implementation – Example</a:t>
-            </a:r>
-            <a:endParaRPr lang="en-US" dirty="0"/>
+            <a:pPr>
+              <a:buFont typeface="Arial" panose="020B0604020202020204" pitchFamily="34" charset="0"/>
+              <a:buChar char="•"/>
+            </a:pPr>
+            <a:r>
+              <a:rPr lang="en-US" dirty="0">
+                <a:hlinkClick r:id="rId2"/>
+              </a:rPr>
+              <a:t>https://</a:t>
+            </a:r>
+            <a:r>
+              <a:rPr lang="en-US" dirty="0" smtClean="0">
+                <a:hlinkClick r:id="rId2"/>
+              </a:rPr>
+              <a:t>youtu.be/ipgdxQoVXWA</a:t>
+            </a:r>
+          </a:p>
+          <a:p>
+            <a:pPr>
+              <a:buFont typeface="Arial" panose="020B0604020202020204" pitchFamily="34" charset="0"/>
+              <a:buChar char="•"/>
+            </a:pPr>
+            <a:r>
+              <a:rPr lang="en-US" dirty="0">
+                <a:latin typeface="Calibri" panose="020F0502020204030204" pitchFamily="34" charset="0"/>
+              </a:rPr>
+              <a:t>Note how the flocking pink agents respond to the presence of the single green agent, once it appears</a:t>
+            </a:r>
+            <a:r>
+              <a:rPr lang="en-US" dirty="0" smtClean="0">
+                <a:latin typeface="Calibri" panose="020F0502020204030204" pitchFamily="34" charset="0"/>
+              </a:rPr>
+              <a:t>.</a:t>
+            </a:r>
+          </a:p>
+          <a:p>
+            <a:pPr>
+              <a:buFont typeface="Arial" panose="020B0604020202020204" pitchFamily="34" charset="0"/>
+              <a:buChar char="•"/>
+            </a:pPr>
+            <a:r>
+              <a:rPr lang="en-US" dirty="0" smtClean="0">
+                <a:latin typeface="Calibri" panose="020F0502020204030204" pitchFamily="34" charset="0"/>
+              </a:rPr>
+              <a:t>(Sorry about the video capture quality!)</a:t>
+            </a:r>
+            <a:endParaRPr lang="en-US" dirty="0">
+              <a:latin typeface="Calibri" panose="020F0502020204030204" pitchFamily="34" charset="0"/>
+            </a:endParaRPr>
           </a:p>
         </p:txBody>
       </p:sp>
     </p:spTree>
     <p:extLst>
       <p:ext uri="{BB962C8B-B14F-4D97-AF65-F5344CB8AC3E}">
-        <p14:creationId xmlns:p14="http://schemas.microsoft.com/office/powerpoint/2010/main" val="2721067632"/>
+        <p14:creationId xmlns:p14="http://schemas.microsoft.com/office/powerpoint/2010/main" val="3822474950"/>
       </p:ext>
     </p:extLst>
   </p:cSld>
@@ -8831,7 +9298,7 @@
   <p:timing>
     <p:tnLst>
       <p:par>
-        <p:cTn xmlns:p14="http://schemas.microsoft.com/office/powerpoint/2010/main" id="1" dur="indefinite" restart="never" nodeType="tmRoot"/>
+        <p:cTn id="1" dur="indefinite" restart="never" nodeType="tmRoot"/>
       </p:par>
     </p:tnLst>
   </p:timing>
@@ -8871,10 +9338,14 @@
           <a:lstStyle/>
           <a:p>
             <a:r>
-              <a:rPr lang="en-US" dirty="0" smtClean="0"/>
-              <a:t>Separation Implementation</a:t>
-            </a:r>
-            <a:endParaRPr lang="en-US" dirty="0"/>
+              <a:rPr lang="en-US" dirty="0" smtClean="0">
+                <a:latin typeface="Calibri" panose="020F0502020204030204" pitchFamily="34" charset="0"/>
+              </a:rPr>
+              <a:t>Further Resources</a:t>
+            </a:r>
+            <a:endParaRPr lang="en-US" dirty="0">
+              <a:latin typeface="Calibri" panose="020F0502020204030204" pitchFamily="34" charset="0"/>
+            </a:endParaRPr>
           </a:p>
         </p:txBody>
       </p:sp>
@@ -8895,58 +9366,58 @@
           </a:bodyPr>
           <a:lstStyle/>
           <a:p>
-            <a:r>
-              <a:rPr lang="en-US" sz="2000" dirty="0" smtClean="0"/>
-              <a:t>Steer </a:t>
-            </a:r>
-            <a:r>
-              <a:rPr lang="en-US" sz="2000" dirty="0"/>
-              <a:t>away from any neighbor that is within view AND within prescribed minimum separation </a:t>
-            </a:r>
-            <a:r>
-              <a:rPr lang="en-US" sz="2000" dirty="0" smtClean="0"/>
-              <a:t>distance (i.e., too close)</a:t>
-            </a:r>
-            <a:endParaRPr lang="en-MY" sz="2000" dirty="0"/>
-          </a:p>
-          <a:p>
-            <a:r>
-              <a:rPr lang="en-US" sz="2000" dirty="0"/>
-              <a:t>Because this steering force is corrective, direction multiplier goes the opposite </a:t>
-            </a:r>
-            <a:r>
-              <a:rPr lang="en-US" sz="2000" dirty="0" smtClean="0"/>
-              <a:t>way</a:t>
-            </a:r>
-          </a:p>
-          <a:p>
-            <a:r>
-              <a:rPr lang="en-US" sz="2000" dirty="0" smtClean="0"/>
-              <a:t>Separation factor can be used to increase force with smaller separations</a:t>
-            </a:r>
-            <a:endParaRPr lang="en-US" sz="2000" dirty="0"/>
-          </a:p>
-          <a:p>
-            <a:r>
-              <a:rPr lang="en-US" sz="2000" dirty="0" smtClean="0"/>
-              <a:t>Steering force = (direction) * (steering force) </a:t>
-            </a:r>
-            <a:r>
-              <a:rPr lang="en-US" sz="2000" dirty="0"/>
-              <a:t>* </a:t>
-            </a:r>
-            <a:r>
-              <a:rPr lang="en-US" sz="2000" dirty="0" smtClean="0"/>
-              <a:t>(separation factor)</a:t>
-            </a:r>
-            <a:endParaRPr lang="en-US" sz="2000" dirty="0"/>
+            <a:pPr>
+              <a:buFont typeface="Arial" panose="020B0604020202020204" pitchFamily="34" charset="0"/>
+              <a:buChar char="•"/>
+            </a:pPr>
+            <a:r>
+              <a:rPr lang="en-US" sz="2400" dirty="0" smtClean="0">
+                <a:latin typeface="Calibri" panose="020F0502020204030204" pitchFamily="34" charset="0"/>
+              </a:rPr>
+              <a:t>Craig Reynolds’s </a:t>
+            </a:r>
+            <a:r>
+              <a:rPr lang="en-US" sz="2400" dirty="0" err="1" smtClean="0">
+                <a:latin typeface="Calibri" panose="020F0502020204030204" pitchFamily="34" charset="0"/>
+              </a:rPr>
+              <a:t>Boids</a:t>
+            </a:r>
+            <a:r>
+              <a:rPr lang="en-US" sz="2400" dirty="0" smtClean="0">
+                <a:latin typeface="Calibri" panose="020F0502020204030204" pitchFamily="34" charset="0"/>
+              </a:rPr>
+              <a:t> page</a:t>
+            </a:r>
+          </a:p>
+          <a:p>
+            <a:pPr lvl="1">
+              <a:buFont typeface="Arial" panose="020B0604020202020204" pitchFamily="34" charset="0"/>
+              <a:buChar char="•"/>
+            </a:pPr>
+            <a:r>
+              <a:rPr lang="en-US" sz="2000" dirty="0">
+                <a:latin typeface="Calibri" panose="020F0502020204030204" pitchFamily="34" charset="0"/>
+                <a:hlinkClick r:id="rId2"/>
+              </a:rPr>
+              <a:t>http://www.red3d.com/cwr/boids</a:t>
+            </a:r>
+            <a:r>
+              <a:rPr lang="en-US" sz="2000" dirty="0" smtClean="0">
+                <a:latin typeface="Calibri" panose="020F0502020204030204" pitchFamily="34" charset="0"/>
+                <a:hlinkClick r:id="rId2"/>
+              </a:rPr>
+              <a:t>/</a:t>
+            </a:r>
+            <a:endParaRPr lang="en-US" sz="2000" dirty="0" smtClean="0">
+              <a:latin typeface="Calibri" panose="020F0502020204030204" pitchFamily="34" charset="0"/>
+            </a:endParaRPr>
           </a:p>
         </p:txBody>
       </p:sp>
     </p:spTree>
     <p:extLst>
       <p:ext uri="{BB962C8B-B14F-4D97-AF65-F5344CB8AC3E}">
-        <p14:creationId xmlns:p14="http://schemas.microsoft.com/office/powerpoint/2010/main" val="1255845839"/>
+        <p14:creationId xmlns:p14="http://schemas.microsoft.com/office/powerpoint/2010/main" val="3532263807"/>
       </p:ext>
     </p:extLst>
   </p:cSld>
@@ -8956,7 +9427,7 @@
   <p:timing>
     <p:tnLst>
       <p:par>
-        <p:cTn xmlns:p14="http://schemas.microsoft.com/office/powerpoint/2010/main" id="1" dur="indefinite" restart="never" nodeType="tmRoot"/>
+        <p:cTn id="1" dur="indefinite" restart="never" nodeType="tmRoot"/>
       </p:par>
     </p:tnLst>
   </p:timing>
@@ -8996,10 +9467,14 @@
           <a:lstStyle/>
           <a:p>
             <a:r>
-              <a:rPr lang="en-US" dirty="0" smtClean="0"/>
+              <a:rPr lang="en-US" dirty="0" smtClean="0">
+                <a:latin typeface="Calibri" panose="020F0502020204030204" pitchFamily="34" charset="0"/>
+              </a:rPr>
               <a:t>Flocking</a:t>
             </a:r>
-            <a:endParaRPr lang="en-US" dirty="0"/>
+            <a:endParaRPr lang="en-US" dirty="0">
+              <a:latin typeface="Calibri" panose="020F0502020204030204" pitchFamily="34" charset="0"/>
+            </a:endParaRPr>
           </a:p>
         </p:txBody>
       </p:sp>
@@ -9018,48 +9493,78 @@
           <a:bodyPr/>
           <a:lstStyle/>
           <a:p>
-            <a:r>
-              <a:rPr lang="en-US" dirty="0" smtClean="0"/>
+            <a:pPr>
+              <a:buFont typeface="Arial" panose="020B0604020202020204" pitchFamily="34" charset="0"/>
+              <a:buChar char="•"/>
+            </a:pPr>
+            <a:r>
+              <a:rPr lang="en-US" dirty="0" smtClean="0">
+                <a:latin typeface="Calibri" panose="020F0502020204030204" pitchFamily="34" charset="0"/>
+              </a:rPr>
               <a:t>Moving together in coordinated groups</a:t>
             </a:r>
           </a:p>
           <a:p>
-            <a:r>
-              <a:rPr lang="en-US" dirty="0" smtClean="0"/>
+            <a:pPr>
+              <a:buFont typeface="Arial" panose="020B0604020202020204" pitchFamily="34" charset="0"/>
+              <a:buChar char="•"/>
+            </a:pPr>
+            <a:r>
+              <a:rPr lang="en-US" dirty="0" smtClean="0">
+                <a:latin typeface="Calibri" panose="020F0502020204030204" pitchFamily="34" charset="0"/>
+              </a:rPr>
               <a:t>Birds in flocks, fish in schools, land animals in herds</a:t>
             </a:r>
           </a:p>
           <a:p>
-            <a:r>
-              <a:rPr lang="en-US" dirty="0" err="1" smtClean="0"/>
+            <a:pPr>
+              <a:buFont typeface="Arial" panose="020B0604020202020204" pitchFamily="34" charset="0"/>
+              <a:buChar char="•"/>
+            </a:pPr>
+            <a:r>
+              <a:rPr lang="en-US" dirty="0" err="1" smtClean="0">
+                <a:latin typeface="Calibri" panose="020F0502020204030204" pitchFamily="34" charset="0"/>
+              </a:rPr>
               <a:t>Murmuration</a:t>
             </a:r>
             <a:r>
-              <a:rPr lang="en-US" dirty="0" smtClean="0"/>
+              <a:rPr lang="en-US" dirty="0" smtClean="0">
+                <a:latin typeface="Calibri" panose="020F0502020204030204" pitchFamily="34" charset="0"/>
+              </a:rPr>
               <a:t> of starlings:</a:t>
             </a:r>
           </a:p>
           <a:p>
-            <a:pPr lvl="1"/>
+            <a:pPr lvl="1">
+              <a:buFont typeface="Arial" panose="020B0604020202020204" pitchFamily="34" charset="0"/>
+              <a:buChar char="•"/>
+            </a:pPr>
             <a:r>
               <a:rPr lang="en-US" dirty="0">
+                <a:latin typeface="Calibri" panose="020F0502020204030204" pitchFamily="34" charset="0"/>
                 <a:hlinkClick r:id="rId2"/>
               </a:rPr>
               <a:t>https://</a:t>
             </a:r>
             <a:r>
               <a:rPr lang="en-US" dirty="0" smtClean="0">
+                <a:latin typeface="Calibri" panose="020F0502020204030204" pitchFamily="34" charset="0"/>
                 <a:hlinkClick r:id="rId2"/>
               </a:rPr>
               <a:t>www.youtube.com/watch?v=eakKfY5aHmY</a:t>
             </a:r>
-            <a:endParaRPr lang="en-US" dirty="0" smtClean="0"/>
-          </a:p>
-          <a:p>
-            <a:pPr marL="0" indent="0">
-              <a:buNone/>
+            <a:endParaRPr lang="en-US" dirty="0" smtClean="0">
+              <a:latin typeface="Calibri" panose="020F0502020204030204" pitchFamily="34" charset="0"/>
+            </a:endParaRPr>
+          </a:p>
+          <a:p>
+            <a:pPr>
+              <a:buFont typeface="Arial" panose="020B0604020202020204" pitchFamily="34" charset="0"/>
+              <a:buChar char="•"/>
             </a:pPr>
-            <a:endParaRPr lang="en-US" dirty="0" smtClean="0"/>
+            <a:endParaRPr lang="en-US" dirty="0" smtClean="0">
+              <a:latin typeface="Calibri" panose="020F0502020204030204" pitchFamily="34" charset="0"/>
+            </a:endParaRPr>
           </a:p>
         </p:txBody>
       </p:sp>
@@ -9076,293 +9581,7 @@
   <p:timing>
     <p:tnLst>
       <p:par>
-        <p:cTn xmlns:p14="http://schemas.microsoft.com/office/powerpoint/2010/main" id="1" dur="indefinite" restart="never" nodeType="tmRoot"/>
-      </p:par>
-    </p:tnLst>
-  </p:timing>
-</p:sld>
-</file>
-
-<file path=ppt/slides/slide20.xml><?xml version="1.0" encoding="utf-8"?>
-<p:sld xmlns:a="http://schemas.openxmlformats.org/drawingml/2006/main" xmlns:r="http://schemas.openxmlformats.org/officeDocument/2006/relationships" xmlns:p="http://schemas.openxmlformats.org/presentationml/2006/main">
-  <p:cSld>
-    <p:spTree>
-      <p:nvGrpSpPr>
-        <p:cNvPr id="1" name=""/>
-        <p:cNvGrpSpPr/>
-        <p:nvPr/>
-      </p:nvGrpSpPr>
-      <p:grpSpPr>
-        <a:xfrm>
-          <a:off x="0" y="0"/>
-          <a:ext cx="0" cy="0"/>
-          <a:chOff x="0" y="0"/>
-          <a:chExt cx="0" cy="0"/>
-        </a:xfrm>
-      </p:grpSpPr>
-      <p:sp>
-        <p:nvSpPr>
-          <p:cNvPr id="2" name="Title 1"/>
-          <p:cNvSpPr>
-            <a:spLocks noGrp="1"/>
-          </p:cNvSpPr>
-          <p:nvPr>
-            <p:ph type="title"/>
-          </p:nvPr>
-        </p:nvSpPr>
-        <p:spPr/>
-        <p:txBody>
-          <a:bodyPr/>
-          <a:lstStyle/>
-          <a:p>
-            <a:r>
-              <a:rPr lang="en-US" dirty="0" smtClean="0"/>
-              <a:t>Separation Implementation – Example</a:t>
-            </a:r>
-            <a:endParaRPr lang="en-US" dirty="0"/>
-          </a:p>
-        </p:txBody>
-      </p:sp>
-    </p:spTree>
-    <p:extLst>
-      <p:ext uri="{BB962C8B-B14F-4D97-AF65-F5344CB8AC3E}">
-        <p14:creationId xmlns:p14="http://schemas.microsoft.com/office/powerpoint/2010/main" val="1169586918"/>
-      </p:ext>
-    </p:extLst>
-  </p:cSld>
-  <p:clrMapOvr>
-    <a:masterClrMapping/>
-  </p:clrMapOvr>
-  <p:timing>
-    <p:tnLst>
-      <p:par>
-        <p:cTn xmlns:p14="http://schemas.microsoft.com/office/powerpoint/2010/main" id="1" dur="indefinite" restart="never" nodeType="tmRoot"/>
-      </p:par>
-    </p:tnLst>
-  </p:timing>
-</p:sld>
-</file>
-
-<file path=ppt/slides/slide21.xml><?xml version="1.0" encoding="utf-8"?>
-<p:sld xmlns:a="http://schemas.openxmlformats.org/drawingml/2006/main" xmlns:r="http://schemas.openxmlformats.org/officeDocument/2006/relationships" xmlns:p="http://schemas.openxmlformats.org/presentationml/2006/main">
-  <p:cSld>
-    <p:spTree>
-      <p:nvGrpSpPr>
-        <p:cNvPr id="1" name=""/>
-        <p:cNvGrpSpPr/>
-        <p:nvPr/>
-      </p:nvGrpSpPr>
-      <p:grpSpPr>
-        <a:xfrm>
-          <a:off x="0" y="0"/>
-          <a:ext cx="0" cy="0"/>
-          <a:chOff x="0" y="0"/>
-          <a:chExt cx="0" cy="0"/>
-        </a:xfrm>
-      </p:grpSpPr>
-      <p:sp>
-        <p:nvSpPr>
-          <p:cNvPr id="2" name="Title 1"/>
-          <p:cNvSpPr>
-            <a:spLocks noGrp="1"/>
-          </p:cNvSpPr>
-          <p:nvPr>
-            <p:ph type="title"/>
-          </p:nvPr>
-        </p:nvSpPr>
-        <p:spPr/>
-        <p:txBody>
-          <a:bodyPr/>
-          <a:lstStyle/>
-          <a:p>
-            <a:r>
-              <a:rPr lang="en-US" dirty="0" smtClean="0"/>
-              <a:t>Demo of Simple Implementation</a:t>
-            </a:r>
-            <a:endParaRPr lang="en-US" dirty="0"/>
-          </a:p>
-        </p:txBody>
-      </p:sp>
-      <p:sp>
-        <p:nvSpPr>
-          <p:cNvPr id="3" name="Content Placeholder 2"/>
-          <p:cNvSpPr>
-            <a:spLocks noGrp="1"/>
-          </p:cNvSpPr>
-          <p:nvPr>
-            <p:ph idx="1"/>
-          </p:nvPr>
-        </p:nvSpPr>
-        <p:spPr/>
-        <p:txBody>
-          <a:bodyPr/>
-          <a:lstStyle/>
-          <a:p>
-            <a:endParaRPr lang="en-US"/>
-          </a:p>
-        </p:txBody>
-      </p:sp>
-    </p:spTree>
-    <p:extLst>
-      <p:ext uri="{BB962C8B-B14F-4D97-AF65-F5344CB8AC3E}">
-        <p14:creationId xmlns:p14="http://schemas.microsoft.com/office/powerpoint/2010/main" val="3822474950"/>
-      </p:ext>
-    </p:extLst>
-  </p:cSld>
-  <p:clrMapOvr>
-    <a:masterClrMapping/>
-  </p:clrMapOvr>
-  <p:timing>
-    <p:tnLst>
-      <p:par>
-        <p:cTn xmlns:p14="http://schemas.microsoft.com/office/powerpoint/2010/main" id="1" dur="indefinite" restart="never" nodeType="tmRoot"/>
-      </p:par>
-    </p:tnLst>
-  </p:timing>
-</p:sld>
-</file>
-
-<file path=ppt/slides/slide22.xml><?xml version="1.0" encoding="utf-8"?>
-<p:sld xmlns:a="http://schemas.openxmlformats.org/drawingml/2006/main" xmlns:r="http://schemas.openxmlformats.org/officeDocument/2006/relationships" xmlns:p="http://schemas.openxmlformats.org/presentationml/2006/main">
-  <p:cSld>
-    <p:spTree>
-      <p:nvGrpSpPr>
-        <p:cNvPr id="1" name=""/>
-        <p:cNvGrpSpPr/>
-        <p:nvPr/>
-      </p:nvGrpSpPr>
-      <p:grpSpPr>
-        <a:xfrm>
-          <a:off x="0" y="0"/>
-          <a:ext cx="0" cy="0"/>
-          <a:chOff x="0" y="0"/>
-          <a:chExt cx="0" cy="0"/>
-        </a:xfrm>
-      </p:grpSpPr>
-      <p:sp>
-        <p:nvSpPr>
-          <p:cNvPr id="2" name="Title 1"/>
-          <p:cNvSpPr>
-            <a:spLocks noGrp="1"/>
-          </p:cNvSpPr>
-          <p:nvPr>
-            <p:ph type="title"/>
-          </p:nvPr>
-        </p:nvSpPr>
-        <p:spPr/>
-        <p:txBody>
-          <a:bodyPr/>
-          <a:lstStyle/>
-          <a:p>
-            <a:r>
-              <a:rPr lang="en-US" dirty="0" smtClean="0"/>
-              <a:t>Further Resources</a:t>
-            </a:r>
-            <a:endParaRPr lang="en-US" dirty="0"/>
-          </a:p>
-        </p:txBody>
-      </p:sp>
-      <p:sp>
-        <p:nvSpPr>
-          <p:cNvPr id="3" name="Content Placeholder 2"/>
-          <p:cNvSpPr>
-            <a:spLocks noGrp="1"/>
-          </p:cNvSpPr>
-          <p:nvPr>
-            <p:ph idx="1"/>
-          </p:nvPr>
-        </p:nvSpPr>
-        <p:spPr/>
-        <p:txBody>
-          <a:bodyPr>
-            <a:normAutofit/>
-          </a:bodyPr>
-          <a:lstStyle/>
-          <a:p>
-            <a:r>
-              <a:rPr lang="en-US" sz="2400" dirty="0" smtClean="0"/>
-              <a:t>Craig Reynolds’s </a:t>
-            </a:r>
-            <a:r>
-              <a:rPr lang="en-US" sz="2400" dirty="0" err="1" smtClean="0"/>
-              <a:t>Boids</a:t>
-            </a:r>
-            <a:r>
-              <a:rPr lang="en-US" sz="2400" dirty="0" smtClean="0"/>
-              <a:t> page</a:t>
-            </a:r>
-          </a:p>
-          <a:p>
-            <a:pPr lvl="1"/>
-            <a:r>
-              <a:rPr lang="en-US" sz="2000" dirty="0">
-                <a:hlinkClick r:id="rId2"/>
-              </a:rPr>
-              <a:t>http://www.red3d.com/cwr/boids</a:t>
-            </a:r>
-            <a:r>
-              <a:rPr lang="en-US" sz="2000" dirty="0" smtClean="0">
-                <a:hlinkClick r:id="rId2"/>
-              </a:rPr>
-              <a:t>/</a:t>
-            </a:r>
-            <a:endParaRPr lang="en-US" sz="2000" dirty="0" smtClean="0"/>
-          </a:p>
-          <a:p>
-            <a:r>
-              <a:rPr lang="en-US" sz="2400" dirty="0" err="1" smtClean="0"/>
-              <a:t>OpenSteer</a:t>
-            </a:r>
-            <a:r>
-              <a:rPr lang="en-US" sz="2400" dirty="0" smtClean="0"/>
-              <a:t> library</a:t>
-            </a:r>
-          </a:p>
-          <a:p>
-            <a:pPr lvl="1"/>
-            <a:r>
-              <a:rPr lang="en-US" sz="2000" dirty="0">
-                <a:hlinkClick r:id="rId3"/>
-              </a:rPr>
-              <a:t>http://opensteer.sourceforge.net</a:t>
-            </a:r>
-            <a:r>
-              <a:rPr lang="en-US" sz="2000" dirty="0" smtClean="0">
-                <a:hlinkClick r:id="rId3"/>
-              </a:rPr>
-              <a:t>/</a:t>
-            </a:r>
-            <a:endParaRPr lang="en-US" sz="2000" dirty="0" smtClean="0"/>
-          </a:p>
-          <a:p>
-            <a:r>
-              <a:rPr lang="en-US" sz="2400" dirty="0" smtClean="0"/>
-              <a:t>Demo code for this presentation</a:t>
-            </a:r>
-          </a:p>
-          <a:p>
-            <a:pPr lvl="1"/>
-            <a:r>
-              <a:rPr lang="en-US" sz="2000" dirty="0" smtClean="0"/>
-              <a:t>https://github.com/NattyBumppo/flockingdemo</a:t>
-            </a:r>
-          </a:p>
-        </p:txBody>
-      </p:sp>
-    </p:spTree>
-    <p:extLst>
-      <p:ext uri="{BB962C8B-B14F-4D97-AF65-F5344CB8AC3E}">
-        <p14:creationId xmlns:p14="http://schemas.microsoft.com/office/powerpoint/2010/main" val="3532263807"/>
-      </p:ext>
-    </p:extLst>
-  </p:cSld>
-  <p:clrMapOvr>
-    <a:masterClrMapping/>
-  </p:clrMapOvr>
-  <p:timing>
-    <p:tnLst>
-      <p:par>
-        <p:cTn xmlns:p14="http://schemas.microsoft.com/office/powerpoint/2010/main" id="1" dur="indefinite" restart="never" nodeType="tmRoot"/>
+        <p:cTn id="1" dur="indefinite" restart="never" nodeType="tmRoot"/>
       </p:par>
     </p:tnLst>
   </p:timing>
@@ -9402,10 +9621,14 @@
           <a:lstStyle/>
           <a:p>
             <a:r>
-              <a:rPr lang="en-US" dirty="0" smtClean="0"/>
+              <a:rPr lang="en-US" dirty="0" smtClean="0">
+                <a:latin typeface="Calibri" panose="020F0502020204030204" pitchFamily="34" charset="0"/>
+              </a:rPr>
               <a:t>Applications to Games</a:t>
             </a:r>
-            <a:endParaRPr lang="en-US" dirty="0"/>
+            <a:endParaRPr lang="en-US" dirty="0">
+              <a:latin typeface="Calibri" panose="020F0502020204030204" pitchFamily="34" charset="0"/>
+            </a:endParaRPr>
           </a:p>
         </p:txBody>
       </p:sp>
@@ -9426,126 +9649,214 @@
           </a:bodyPr>
           <a:lstStyle/>
           <a:p>
-            <a:r>
-              <a:rPr lang="en-US" sz="2000" dirty="0" smtClean="0"/>
+            <a:pPr>
+              <a:buFont typeface="Arial" panose="020B0604020202020204" pitchFamily="34" charset="0"/>
+              <a:buChar char="•"/>
+            </a:pPr>
+            <a:r>
+              <a:rPr lang="en-US" sz="2000" dirty="0" smtClean="0">
+                <a:latin typeface="Calibri" panose="020F0502020204030204" pitchFamily="34" charset="0"/>
+              </a:rPr>
               <a:t>NPCs can </a:t>
             </a:r>
             <a:r>
-              <a:rPr lang="en-US" sz="2000" dirty="0"/>
+              <a:rPr lang="en-US" sz="2000" dirty="0">
+                <a:latin typeface="Calibri" panose="020F0502020204030204" pitchFamily="34" charset="0"/>
+              </a:rPr>
               <a:t>move in cohesive </a:t>
             </a:r>
             <a:r>
-              <a:rPr lang="en-US" sz="2000" dirty="0" smtClean="0"/>
+              <a:rPr lang="en-US" sz="2000" dirty="0" smtClean="0">
+                <a:latin typeface="Calibri" panose="020F0502020204030204" pitchFamily="34" charset="0"/>
+              </a:rPr>
               <a:t>groups</a:t>
             </a:r>
           </a:p>
           <a:p>
-            <a:pPr lvl="1"/>
-            <a:r>
-              <a:rPr lang="en-US" sz="1800" dirty="0" smtClean="0"/>
+            <a:pPr lvl="1">
+              <a:buFont typeface="Arial" panose="020B0604020202020204" pitchFamily="34" charset="0"/>
+              <a:buChar char="•"/>
+            </a:pPr>
+            <a:r>
+              <a:rPr lang="en-US" sz="1800" dirty="0" smtClean="0">
+                <a:latin typeface="Calibri" panose="020F0502020204030204" pitchFamily="34" charset="0"/>
+              </a:rPr>
               <a:t>Meadow </a:t>
             </a:r>
             <a:r>
-              <a:rPr lang="en-US" sz="1800" dirty="0"/>
+              <a:rPr lang="en-US" sz="1800" dirty="0">
+                <a:latin typeface="Calibri" panose="020F0502020204030204" pitchFamily="34" charset="0"/>
+              </a:rPr>
               <a:t>of </a:t>
             </a:r>
             <a:r>
-              <a:rPr lang="en-US" sz="1800" dirty="0" smtClean="0"/>
+              <a:rPr lang="en-US" sz="1800" dirty="0" smtClean="0">
+                <a:latin typeface="Calibri" panose="020F0502020204030204" pitchFamily="34" charset="0"/>
+              </a:rPr>
               <a:t>grazing sheep</a:t>
             </a:r>
-            <a:endParaRPr lang="en-US" sz="1800" dirty="0"/>
-          </a:p>
-          <a:p>
-            <a:pPr lvl="1"/>
-            <a:r>
-              <a:rPr lang="en-US" sz="1800" dirty="0"/>
+            <a:endParaRPr lang="en-US" sz="1800" dirty="0">
+              <a:latin typeface="Calibri" panose="020F0502020204030204" pitchFamily="34" charset="0"/>
+            </a:endParaRPr>
+          </a:p>
+          <a:p>
+            <a:pPr lvl="1">
+              <a:buFont typeface="Arial" panose="020B0604020202020204" pitchFamily="34" charset="0"/>
+              <a:buChar char="•"/>
+            </a:pPr>
+            <a:r>
+              <a:rPr lang="en-US" sz="1800" dirty="0">
+                <a:latin typeface="Calibri" panose="020F0502020204030204" pitchFamily="34" charset="0"/>
+              </a:rPr>
               <a:t>Hunting flock of </a:t>
             </a:r>
             <a:r>
-              <a:rPr lang="en-US" sz="1800" dirty="0" smtClean="0"/>
+              <a:rPr lang="en-US" sz="1800" dirty="0" smtClean="0">
+                <a:latin typeface="Calibri" panose="020F0502020204030204" pitchFamily="34" charset="0"/>
+              </a:rPr>
               <a:t>birds</a:t>
             </a:r>
-            <a:endParaRPr lang="en-US" sz="1800" dirty="0"/>
-          </a:p>
-          <a:p>
-            <a:pPr lvl="1"/>
-            <a:r>
-              <a:rPr lang="en-US" sz="1800" dirty="0" smtClean="0"/>
+            <a:endParaRPr lang="en-US" sz="1800" dirty="0">
+              <a:latin typeface="Calibri" panose="020F0502020204030204" pitchFamily="34" charset="0"/>
+            </a:endParaRPr>
+          </a:p>
+          <a:p>
+            <a:pPr lvl="1">
+              <a:buFont typeface="Arial" panose="020B0604020202020204" pitchFamily="34" charset="0"/>
+              <a:buChar char="•"/>
+            </a:pPr>
+            <a:r>
+              <a:rPr lang="en-US" sz="1800" dirty="0" smtClean="0">
+                <a:latin typeface="Calibri" panose="020F0502020204030204" pitchFamily="34" charset="0"/>
+              </a:rPr>
               <a:t>Ants, bees, fish</a:t>
             </a:r>
-            <a:endParaRPr lang="en-US" sz="1800" dirty="0"/>
-          </a:p>
-          <a:p>
-            <a:r>
-              <a:rPr lang="en-US" sz="2000" dirty="0"/>
+            <a:endParaRPr lang="en-US" sz="1800" dirty="0">
+              <a:latin typeface="Calibri" panose="020F0502020204030204" pitchFamily="34" charset="0"/>
+            </a:endParaRPr>
+          </a:p>
+          <a:p>
+            <a:pPr>
+              <a:buFont typeface="Arial" panose="020B0604020202020204" pitchFamily="34" charset="0"/>
+              <a:buChar char="•"/>
+            </a:pPr>
+            <a:r>
+              <a:rPr lang="en-US" sz="2000" dirty="0">
+                <a:latin typeface="Calibri" panose="020F0502020204030204" pitchFamily="34" charset="0"/>
+              </a:rPr>
               <a:t>Other types of </a:t>
             </a:r>
             <a:r>
-              <a:rPr lang="en-US" sz="2000" dirty="0" smtClean="0"/>
+              <a:rPr lang="en-US" sz="2000" dirty="0" smtClean="0">
+                <a:latin typeface="Calibri" panose="020F0502020204030204" pitchFamily="34" charset="0"/>
+              </a:rPr>
               <a:t>computer-controlled </a:t>
             </a:r>
             <a:r>
-              <a:rPr lang="en-US" sz="2000" dirty="0"/>
+              <a:rPr lang="en-US" sz="2000" dirty="0">
+                <a:latin typeface="Calibri" panose="020F0502020204030204" pitchFamily="34" charset="0"/>
+              </a:rPr>
               <a:t>NPCs</a:t>
             </a:r>
           </a:p>
           <a:p>
-            <a:pPr lvl="1"/>
-            <a:r>
-              <a:rPr lang="en-US" sz="1800" dirty="0"/>
+            <a:pPr lvl="1">
+              <a:buFont typeface="Arial" panose="020B0604020202020204" pitchFamily="34" charset="0"/>
+              <a:buChar char="•"/>
+            </a:pPr>
+            <a:r>
+              <a:rPr lang="en-US" sz="1800" dirty="0">
+                <a:latin typeface="Calibri" panose="020F0502020204030204" pitchFamily="34" charset="0"/>
+              </a:rPr>
               <a:t>Humans, </a:t>
             </a:r>
             <a:r>
-              <a:rPr lang="en-US" sz="1800" dirty="0" smtClean="0"/>
+              <a:rPr lang="en-US" sz="1800" dirty="0" smtClean="0">
+                <a:latin typeface="Calibri" panose="020F0502020204030204" pitchFamily="34" charset="0"/>
+              </a:rPr>
               <a:t>orcs, catapults</a:t>
             </a:r>
-            <a:endParaRPr lang="en-US" sz="1800" dirty="0"/>
-          </a:p>
-          <a:p>
-            <a:pPr lvl="1"/>
-            <a:r>
-              <a:rPr lang="en-US" sz="1800" dirty="0"/>
+            <a:endParaRPr lang="en-US" sz="1800" dirty="0">
+              <a:latin typeface="Calibri" panose="020F0502020204030204" pitchFamily="34" charset="0"/>
+            </a:endParaRPr>
+          </a:p>
+          <a:p>
+            <a:pPr lvl="1">
+              <a:buFont typeface="Arial" panose="020B0604020202020204" pitchFamily="34" charset="0"/>
+              <a:buChar char="•"/>
+            </a:pPr>
+            <a:r>
+              <a:rPr lang="en-US" sz="1800" dirty="0">
+                <a:latin typeface="Calibri" panose="020F0502020204030204" pitchFamily="34" charset="0"/>
+              </a:rPr>
               <a:t>Squadrons of </a:t>
             </a:r>
             <a:r>
-              <a:rPr lang="en-US" sz="1800" dirty="0" smtClean="0"/>
+              <a:rPr lang="en-US" sz="1800" dirty="0" smtClean="0">
+                <a:latin typeface="Calibri" panose="020F0502020204030204" pitchFamily="34" charset="0"/>
+              </a:rPr>
               <a:t>aircraft</a:t>
             </a:r>
-            <a:endParaRPr lang="en-US" sz="1800" dirty="0"/>
-          </a:p>
-          <a:p>
-            <a:pPr lvl="1"/>
-            <a:r>
-              <a:rPr lang="en-US" sz="1800" dirty="0"/>
+            <a:endParaRPr lang="en-US" sz="1800" dirty="0">
+              <a:latin typeface="Calibri" panose="020F0502020204030204" pitchFamily="34" charset="0"/>
+            </a:endParaRPr>
+          </a:p>
+          <a:p>
+            <a:pPr lvl="1">
+              <a:buFont typeface="Arial" panose="020B0604020202020204" pitchFamily="34" charset="0"/>
+              <a:buChar char="•"/>
+            </a:pPr>
+            <a:r>
+              <a:rPr lang="en-US" sz="1800" dirty="0">
+                <a:latin typeface="Calibri" panose="020F0502020204030204" pitchFamily="34" charset="0"/>
+              </a:rPr>
               <a:t>Friendly soldier </a:t>
             </a:r>
             <a:r>
-              <a:rPr lang="en-US" sz="1800" dirty="0" smtClean="0"/>
+              <a:rPr lang="en-US" sz="1800" dirty="0" smtClean="0">
+                <a:latin typeface="Calibri" panose="020F0502020204030204" pitchFamily="34" charset="0"/>
+              </a:rPr>
               <a:t>squads</a:t>
             </a:r>
-            <a:endParaRPr lang="en-US" sz="1800" dirty="0"/>
-          </a:p>
-          <a:p>
-            <a:pPr lvl="1"/>
-            <a:r>
-              <a:rPr lang="en-US" sz="1800" dirty="0" smtClean="0"/>
+            <a:endParaRPr lang="en-US" sz="1800" dirty="0">
+              <a:latin typeface="Calibri" panose="020F0502020204030204" pitchFamily="34" charset="0"/>
+            </a:endParaRPr>
+          </a:p>
+          <a:p>
+            <a:pPr lvl="1">
+              <a:buFont typeface="Arial" panose="020B0604020202020204" pitchFamily="34" charset="0"/>
+              <a:buChar char="•"/>
+            </a:pPr>
+            <a:r>
+              <a:rPr lang="en-US" sz="1800" dirty="0" smtClean="0">
+                <a:latin typeface="Calibri" panose="020F0502020204030204" pitchFamily="34" charset="0"/>
+              </a:rPr>
               <a:t>Crowds </a:t>
             </a:r>
             <a:r>
-              <a:rPr lang="en-US" sz="1800" dirty="0"/>
+              <a:rPr lang="en-US" sz="1800" dirty="0">
+                <a:latin typeface="Calibri" panose="020F0502020204030204" pitchFamily="34" charset="0"/>
+              </a:rPr>
               <a:t>of people </a:t>
             </a:r>
             <a:r>
-              <a:rPr lang="en-US" sz="1800" dirty="0" smtClean="0"/>
+              <a:rPr lang="en-US" sz="1800" dirty="0" smtClean="0">
+                <a:latin typeface="Calibri" panose="020F0502020204030204" pitchFamily="34" charset="0"/>
+              </a:rPr>
               <a:t>loitering</a:t>
             </a:r>
-            <a:endParaRPr lang="en-US" sz="1800" dirty="0"/>
-          </a:p>
-          <a:p>
-            <a:pPr marL="0" indent="0">
-              <a:buNone/>
+            <a:endParaRPr lang="en-US" sz="1800" dirty="0">
+              <a:latin typeface="Calibri" panose="020F0502020204030204" pitchFamily="34" charset="0"/>
+            </a:endParaRPr>
+          </a:p>
+          <a:p>
+            <a:pPr>
+              <a:buFont typeface="Arial" panose="020B0604020202020204" pitchFamily="34" charset="0"/>
+              <a:buChar char="•"/>
             </a:pPr>
-            <a:endParaRPr lang="en-US" sz="2000" dirty="0"/>
+            <a:endParaRPr lang="en-US" sz="2000" dirty="0">
+              <a:latin typeface="Calibri" panose="020F0502020204030204" pitchFamily="34" charset="0"/>
+            </a:endParaRPr>
           </a:p>
         </p:txBody>
       </p:sp>
@@ -9562,7 +9873,7 @@
   <p:timing>
     <p:tnLst>
       <p:par>
-        <p:cTn xmlns:p14="http://schemas.microsoft.com/office/powerpoint/2010/main" id="1" dur="indefinite" restart="never" nodeType="tmRoot"/>
+        <p:cTn id="1" dur="indefinite" restart="never" nodeType="tmRoot"/>
       </p:par>
     </p:tnLst>
   </p:timing>
@@ -9602,10 +9913,14 @@
           <a:lstStyle/>
           <a:p>
             <a:r>
-              <a:rPr lang="en-US" dirty="0" smtClean="0"/>
+              <a:rPr lang="en-US" dirty="0" smtClean="0">
+                <a:latin typeface="Calibri" panose="020F0502020204030204" pitchFamily="34" charset="0"/>
+              </a:rPr>
               <a:t>Behavioral Modeling of Flocking</a:t>
             </a:r>
-            <a:endParaRPr lang="en-US" dirty="0"/>
+            <a:endParaRPr lang="en-US" dirty="0">
+              <a:latin typeface="Calibri" panose="020F0502020204030204" pitchFamily="34" charset="0"/>
+            </a:endParaRPr>
           </a:p>
         </p:txBody>
       </p:sp>
@@ -9626,100 +9941,146 @@
           </a:bodyPr>
           <a:lstStyle/>
           <a:p>
-            <a:r>
-              <a:rPr lang="en-US" sz="2000" dirty="0" smtClean="0"/>
+            <a:pPr>
+              <a:buFont typeface="Arial" panose="020B0604020202020204" pitchFamily="34" charset="0"/>
+              <a:buChar char="•"/>
+            </a:pPr>
+            <a:r>
+              <a:rPr lang="en-US" sz="2000" dirty="0" smtClean="0">
+                <a:latin typeface="Calibri" panose="020F0502020204030204" pitchFamily="34" charset="0"/>
+              </a:rPr>
               <a:t>Craig Reynolds developed flocking model</a:t>
-            </a:r>
-            <a:br>
-              <a:rPr lang="en-US" sz="2000" dirty="0" smtClean="0"/>
-            </a:br>
-            <a:r>
-              <a:rPr lang="en-US" sz="2000" dirty="0" smtClean="0"/>
-              <a:t>in 1986</a:t>
-            </a:r>
-          </a:p>
-          <a:p>
-            <a:r>
-              <a:rPr lang="en-US" sz="2000" dirty="0" smtClean="0"/>
-              <a:t>“</a:t>
-            </a:r>
-            <a:r>
-              <a:rPr lang="en-US" sz="2000" dirty="0" err="1" smtClean="0"/>
-              <a:t>Boids</a:t>
-            </a:r>
-            <a:r>
-              <a:rPr lang="en-US" sz="2000" dirty="0" smtClean="0"/>
-              <a:t>” model</a:t>
-            </a:r>
-          </a:p>
-          <a:p>
-            <a:r>
-              <a:rPr lang="en-US" sz="2000" dirty="0" smtClean="0"/>
-              <a:t>Presented at SIGGRAPH 1987: “</a:t>
-            </a:r>
-            <a:r>
-              <a:rPr lang="en-US" sz="2000" dirty="0" smtClean="0">
-                <a:sym typeface="Wingdings" pitchFamily="2" charset="2"/>
-              </a:rPr>
-              <a:t>Flocks</a:t>
-            </a:r>
-            <a:r>
-              <a:rPr lang="en-US" sz="2000" dirty="0">
-                <a:sym typeface="Wingdings" pitchFamily="2" charset="2"/>
-              </a:rPr>
-              <a:t>, </a:t>
-            </a:r>
-            <a:r>
-              <a:rPr lang="en-US" sz="2000" dirty="0" smtClean="0">
-                <a:sym typeface="Wingdings" pitchFamily="2" charset="2"/>
-              </a:rPr>
-              <a:t>Herds,</a:t>
             </a:r>
             <a:br>
               <a:rPr lang="en-US" sz="2000" dirty="0" smtClean="0">
+                <a:latin typeface="Calibri" panose="020F0502020204030204" pitchFamily="34" charset="0"/>
+              </a:rPr>
+            </a:br>
+            <a:r>
+              <a:rPr lang="en-US" sz="2000" dirty="0" smtClean="0">
+                <a:latin typeface="Calibri" panose="020F0502020204030204" pitchFamily="34" charset="0"/>
+              </a:rPr>
+              <a:t>in 1986</a:t>
+            </a:r>
+          </a:p>
+          <a:p>
+            <a:pPr>
+              <a:buFont typeface="Arial" panose="020B0604020202020204" pitchFamily="34" charset="0"/>
+              <a:buChar char="•"/>
+            </a:pPr>
+            <a:r>
+              <a:rPr lang="en-US" sz="2000" dirty="0" smtClean="0">
+                <a:latin typeface="Calibri" panose="020F0502020204030204" pitchFamily="34" charset="0"/>
+              </a:rPr>
+              <a:t>“</a:t>
+            </a:r>
+            <a:r>
+              <a:rPr lang="en-US" sz="2000" dirty="0" err="1" smtClean="0">
+                <a:latin typeface="Calibri" panose="020F0502020204030204" pitchFamily="34" charset="0"/>
+              </a:rPr>
+              <a:t>Boids</a:t>
+            </a:r>
+            <a:r>
+              <a:rPr lang="en-US" sz="2000" dirty="0" smtClean="0">
+                <a:latin typeface="Calibri" panose="020F0502020204030204" pitchFamily="34" charset="0"/>
+              </a:rPr>
+              <a:t>” model</a:t>
+            </a:r>
+          </a:p>
+          <a:p>
+            <a:pPr>
+              <a:buFont typeface="Arial" panose="020B0604020202020204" pitchFamily="34" charset="0"/>
+              <a:buChar char="•"/>
+            </a:pPr>
+            <a:r>
+              <a:rPr lang="en-US" sz="2000" dirty="0" smtClean="0">
+                <a:latin typeface="Calibri" panose="020F0502020204030204" pitchFamily="34" charset="0"/>
+              </a:rPr>
+              <a:t>Presented at SIGGRAPH 1987: “</a:t>
+            </a:r>
+            <a:r>
+              <a:rPr lang="en-US" sz="2000" dirty="0" smtClean="0">
+                <a:latin typeface="Calibri" panose="020F0502020204030204" pitchFamily="34" charset="0"/>
                 <a:sym typeface="Wingdings" pitchFamily="2" charset="2"/>
               </a:rPr>
-            </a:br>
+              <a:t>Flocks</a:t>
+            </a:r>
+            <a:r>
+              <a:rPr lang="en-US" sz="2000" dirty="0">
+                <a:latin typeface="Calibri" panose="020F0502020204030204" pitchFamily="34" charset="0"/>
+                <a:sym typeface="Wingdings" pitchFamily="2" charset="2"/>
+              </a:rPr>
+              <a:t>, </a:t>
+            </a:r>
             <a:r>
               <a:rPr lang="en-US" sz="2000" dirty="0" smtClean="0">
+                <a:latin typeface="Calibri" panose="020F0502020204030204" pitchFamily="34" charset="0"/>
                 <a:sym typeface="Wingdings" pitchFamily="2" charset="2"/>
               </a:rPr>
-              <a:t>and </a:t>
-            </a:r>
-            <a:r>
-              <a:rPr lang="en-US" sz="2000" dirty="0">
-                <a:sym typeface="Wingdings" pitchFamily="2" charset="2"/>
-              </a:rPr>
-              <a:t>Schools: A Distributed Behavioral </a:t>
-            </a:r>
-            <a:r>
-              <a:rPr lang="en-US" sz="2000" dirty="0" smtClean="0">
-                <a:sym typeface="Wingdings" pitchFamily="2" charset="2"/>
-              </a:rPr>
-              <a:t>Model”</a:t>
-            </a:r>
-          </a:p>
-          <a:p>
-            <a:r>
-              <a:rPr lang="en-US" sz="2000" dirty="0" smtClean="0">
-                <a:sym typeface="Wingdings" pitchFamily="2" charset="2"/>
-              </a:rPr>
-              <a:t>Later went on to do flocking animation for</a:t>
+              <a:t>Herds,</a:t>
             </a:r>
             <a:br>
               <a:rPr lang="en-US" sz="2000" dirty="0" smtClean="0">
+                <a:latin typeface="Calibri" panose="020F0502020204030204" pitchFamily="34" charset="0"/>
                 <a:sym typeface="Wingdings" pitchFamily="2" charset="2"/>
               </a:rPr>
             </a:br>
             <a:r>
               <a:rPr lang="en-US" sz="2000" dirty="0" smtClean="0">
+                <a:latin typeface="Calibri" panose="020F0502020204030204" pitchFamily="34" charset="0"/>
                 <a:sym typeface="Wingdings" pitchFamily="2" charset="2"/>
               </a:rPr>
+              <a:t>and </a:t>
+            </a:r>
+            <a:r>
+              <a:rPr lang="en-US" sz="2000" dirty="0">
+                <a:latin typeface="Calibri" panose="020F0502020204030204" pitchFamily="34" charset="0"/>
+                <a:sym typeface="Wingdings" pitchFamily="2" charset="2"/>
+              </a:rPr>
+              <a:t>Schools: A Distributed Behavioral </a:t>
+            </a:r>
+            <a:r>
+              <a:rPr lang="en-US" sz="2000" dirty="0" smtClean="0">
+                <a:latin typeface="Calibri" panose="020F0502020204030204" pitchFamily="34" charset="0"/>
+                <a:sym typeface="Wingdings" pitchFamily="2" charset="2"/>
+              </a:rPr>
+              <a:t>Model”</a:t>
+            </a:r>
+          </a:p>
+          <a:p>
+            <a:pPr>
+              <a:buFont typeface="Arial" panose="020B0604020202020204" pitchFamily="34" charset="0"/>
+              <a:buChar char="•"/>
+            </a:pPr>
+            <a:r>
+              <a:rPr lang="en-US" sz="2000" dirty="0" smtClean="0">
+                <a:latin typeface="Calibri" panose="020F0502020204030204" pitchFamily="34" charset="0"/>
+                <a:sym typeface="Wingdings" pitchFamily="2" charset="2"/>
+              </a:rPr>
+              <a:t>Later went on to do flocking animation for</a:t>
+            </a:r>
+            <a:br>
+              <a:rPr lang="en-US" sz="2000" dirty="0" smtClean="0">
+                <a:latin typeface="Calibri" panose="020F0502020204030204" pitchFamily="34" charset="0"/>
+                <a:sym typeface="Wingdings" pitchFamily="2" charset="2"/>
+              </a:rPr>
+            </a:br>
+            <a:r>
+              <a:rPr lang="en-US" sz="2000" dirty="0" smtClean="0">
+                <a:latin typeface="Calibri" panose="020F0502020204030204" pitchFamily="34" charset="0"/>
+                <a:sym typeface="Wingdings" pitchFamily="2" charset="2"/>
+              </a:rPr>
               <a:t>DreamWorks and Sony</a:t>
             </a:r>
           </a:p>
           <a:p>
-            <a:endParaRPr lang="en-US" sz="2000" dirty="0"/>
+            <a:pPr>
+              <a:buFont typeface="Arial" panose="020B0604020202020204" pitchFamily="34" charset="0"/>
+              <a:buChar char="•"/>
+            </a:pPr>
+            <a:endParaRPr lang="en-US" sz="2000" dirty="0">
+              <a:latin typeface="Calibri" panose="020F0502020204030204" pitchFamily="34" charset="0"/>
+            </a:endParaRPr>
           </a:p>
         </p:txBody>
       </p:sp>
@@ -9754,7 +10115,7 @@
           </a:prstGeom>
           <a:noFill/>
           <a:extLst>
-            <a:ext uri="{909E8E84-426E-40dd-AFC4-6F175D3DCCD1}">
+            <a:ext uri="{909E8E84-426E-40DD-AFC4-6F175D3DCCD1}">
               <a14:hiddenFill xmlns:a14="http://schemas.microsoft.com/office/drawing/2010/main">
                 <a:solidFill>
                   <a:srgbClr val="FFFFFF"/>
@@ -9777,7 +10138,7 @@
   <p:timing>
     <p:tnLst>
       <p:par>
-        <p:cTn xmlns:p14="http://schemas.microsoft.com/office/powerpoint/2010/main" id="1" dur="indefinite" restart="never" nodeType="tmRoot"/>
+        <p:cTn id="1" dur="indefinite" restart="never" nodeType="tmRoot"/>
       </p:par>
     </p:tnLst>
   </p:timing>
@@ -9817,10 +10178,14 @@
           <a:lstStyle/>
           <a:p>
             <a:r>
-              <a:rPr lang="en-US" dirty="0" smtClean="0"/>
+              <a:rPr lang="en-US" dirty="0" smtClean="0">
+                <a:latin typeface="Calibri" panose="020F0502020204030204" pitchFamily="34" charset="0"/>
+              </a:rPr>
               <a:t>Examples in Media</a:t>
             </a:r>
-            <a:endParaRPr lang="en-US" dirty="0"/>
+            <a:endParaRPr lang="en-US" dirty="0">
+              <a:latin typeface="Calibri" panose="020F0502020204030204" pitchFamily="34" charset="0"/>
+            </a:endParaRPr>
           </a:p>
         </p:txBody>
       </p:sp>
@@ -9836,106 +10201,201 @@
         </p:nvSpPr>
         <p:spPr/>
         <p:txBody>
-          <a:bodyPr/>
+          <a:bodyPr>
+            <a:normAutofit fontScale="92500" lnSpcReduction="10000"/>
+          </a:bodyPr>
           <a:lstStyle/>
           <a:p>
-            <a:r>
-              <a:rPr lang="en-US" dirty="0" smtClean="0"/>
-              <a:t>First used for bats in Batman Returns (1992)</a:t>
-            </a:r>
-          </a:p>
-          <a:p>
-            <a:r>
-              <a:rPr lang="en-US" dirty="0" smtClean="0"/>
+            <a:pPr>
+              <a:buFont typeface="Arial" panose="020B0604020202020204" pitchFamily="34" charset="0"/>
+              <a:buChar char="•"/>
+            </a:pPr>
+            <a:r>
+              <a:rPr lang="en-US" dirty="0" smtClean="0">
+                <a:latin typeface="Calibri" panose="020F0502020204030204" pitchFamily="34" charset="0"/>
+              </a:rPr>
+              <a:t>First used for bats and penguins in Batman Returns (1992)</a:t>
+            </a:r>
+          </a:p>
+          <a:p>
+            <a:pPr lvl="1">
+              <a:buFont typeface="Arial" panose="020B0604020202020204" pitchFamily="34" charset="0"/>
+              <a:buChar char="•"/>
+            </a:pPr>
+            <a:r>
+              <a:rPr lang="en-US" dirty="0" smtClean="0">
+                <a:latin typeface="Calibri" panose="020F0502020204030204" pitchFamily="34" charset="0"/>
+                <a:hlinkClick r:id="rId2"/>
+              </a:rPr>
+              <a:t>https://www.youtube.com/watch?v=Mo_1rAaj7FE#t=5</a:t>
+            </a:r>
+            <a:endParaRPr lang="en-US" dirty="0" smtClean="0">
+              <a:latin typeface="Calibri" panose="020F0502020204030204" pitchFamily="34" charset="0"/>
+            </a:endParaRPr>
+          </a:p>
+          <a:p>
+            <a:pPr lvl="1">
+              <a:buFont typeface="Arial" panose="020B0604020202020204" pitchFamily="34" charset="0"/>
+              <a:buChar char="•"/>
+            </a:pPr>
+            <a:r>
+              <a:rPr lang="en-US" dirty="0">
+                <a:latin typeface="Calibri" panose="020F0502020204030204" pitchFamily="34" charset="0"/>
+                <a:hlinkClick r:id="rId3"/>
+              </a:rPr>
+              <a:t>https://youtu.be/jCVwdeAobYc?t=15</a:t>
+            </a:r>
+            <a:endParaRPr lang="en-US" dirty="0" smtClean="0">
+              <a:latin typeface="Calibri" panose="020F0502020204030204" pitchFamily="34" charset="0"/>
+            </a:endParaRPr>
+          </a:p>
+          <a:p>
+            <a:pPr>
+              <a:buFont typeface="Arial" panose="020B0604020202020204" pitchFamily="34" charset="0"/>
+              <a:buChar char="•"/>
+            </a:pPr>
+            <a:r>
+              <a:rPr lang="en-US" dirty="0" smtClean="0">
+                <a:latin typeface="Calibri" panose="020F0502020204030204" pitchFamily="34" charset="0"/>
+              </a:rPr>
               <a:t>Jurassic Park (1993)</a:t>
             </a:r>
           </a:p>
           <a:p>
-            <a:pPr lvl="1"/>
+            <a:pPr lvl="1">
+              <a:buFont typeface="Arial" panose="020B0604020202020204" pitchFamily="34" charset="0"/>
+              <a:buChar char="•"/>
+            </a:pPr>
             <a:r>
               <a:rPr lang="en-US" dirty="0">
-                <a:hlinkClick r:id="rId2"/>
+                <a:latin typeface="Calibri" panose="020F0502020204030204" pitchFamily="34" charset="0"/>
+                <a:hlinkClick r:id="rId4"/>
               </a:rPr>
               <a:t>https://</a:t>
             </a:r>
             <a:r>
               <a:rPr lang="en-US" dirty="0" smtClean="0">
-                <a:hlinkClick r:id="rId2"/>
+                <a:latin typeface="Calibri" panose="020F0502020204030204" pitchFamily="34" charset="0"/>
+                <a:hlinkClick r:id="rId4"/>
               </a:rPr>
               <a:t>www.youtube.com/watch?v=nM-RPO10aPY</a:t>
             </a:r>
-            <a:endParaRPr lang="en-US" dirty="0" smtClean="0"/>
-          </a:p>
-          <a:p>
-            <a:r>
-              <a:rPr lang="en-US" dirty="0" smtClean="0"/>
+            <a:endParaRPr lang="en-US" dirty="0" smtClean="0">
+              <a:latin typeface="Calibri" panose="020F0502020204030204" pitchFamily="34" charset="0"/>
+            </a:endParaRPr>
+          </a:p>
+          <a:p>
+            <a:pPr>
+              <a:buFont typeface="Arial" panose="020B0604020202020204" pitchFamily="34" charset="0"/>
+              <a:buChar char="•"/>
+            </a:pPr>
+            <a:r>
+              <a:rPr lang="en-US" dirty="0" smtClean="0">
+                <a:latin typeface="Calibri" panose="020F0502020204030204" pitchFamily="34" charset="0"/>
+              </a:rPr>
               <a:t>Assassin’s Creed (various)</a:t>
             </a:r>
           </a:p>
           <a:p>
-            <a:pPr lvl="1"/>
+            <a:pPr lvl="1">
+              <a:buFont typeface="Arial" panose="020B0604020202020204" pitchFamily="34" charset="0"/>
+              <a:buChar char="•"/>
+            </a:pPr>
             <a:r>
               <a:rPr lang="en-US" dirty="0">
-                <a:hlinkClick r:id="rId3"/>
+                <a:latin typeface="Calibri" panose="020F0502020204030204" pitchFamily="34" charset="0"/>
+                <a:hlinkClick r:id="rId5"/>
               </a:rPr>
               <a:t>https://</a:t>
             </a:r>
             <a:r>
               <a:rPr lang="en-US" dirty="0" smtClean="0">
-                <a:hlinkClick r:id="rId3"/>
+                <a:latin typeface="Calibri" panose="020F0502020204030204" pitchFamily="34" charset="0"/>
+                <a:hlinkClick r:id="rId5"/>
               </a:rPr>
               <a:t>www.youtube.com/watch?v=ACWIRMePpxk#t=597</a:t>
             </a:r>
-            <a:endParaRPr lang="en-US" dirty="0" smtClean="0"/>
-          </a:p>
-          <a:p>
-            <a:r>
-              <a:rPr lang="en-US" dirty="0" smtClean="0"/>
+            <a:endParaRPr lang="en-US" dirty="0" smtClean="0">
+              <a:latin typeface="Calibri" panose="020F0502020204030204" pitchFamily="34" charset="0"/>
+            </a:endParaRPr>
+          </a:p>
+          <a:p>
+            <a:pPr>
+              <a:buFont typeface="Arial" panose="020B0604020202020204" pitchFamily="34" charset="0"/>
+              <a:buChar char="•"/>
+            </a:pPr>
+            <a:r>
+              <a:rPr lang="en-US" dirty="0" smtClean="0">
+                <a:latin typeface="Calibri" panose="020F0502020204030204" pitchFamily="34" charset="0"/>
+              </a:rPr>
               <a:t>Countless other films and games</a:t>
             </a:r>
           </a:p>
           <a:p>
-            <a:r>
-              <a:rPr lang="en-US" dirty="0" smtClean="0"/>
+            <a:pPr>
+              <a:buFont typeface="Arial" panose="020B0604020202020204" pitchFamily="34" charset="0"/>
+              <a:buChar char="•"/>
+            </a:pPr>
+            <a:r>
+              <a:rPr lang="en-US" dirty="0" smtClean="0">
+                <a:latin typeface="Calibri" panose="020F0502020204030204" pitchFamily="34" charset="0"/>
+              </a:rPr>
               <a:t>Autonomous robotics:</a:t>
             </a:r>
           </a:p>
           <a:p>
-            <a:pPr lvl="1"/>
-            <a:r>
-              <a:rPr lang="en-US" dirty="0" smtClean="0"/>
+            <a:pPr lvl="1">
+              <a:buFont typeface="Arial" panose="020B0604020202020204" pitchFamily="34" charset="0"/>
+              <a:buChar char="•"/>
+            </a:pPr>
+            <a:r>
+              <a:rPr lang="en-US" dirty="0" smtClean="0">
+                <a:latin typeface="Calibri" panose="020F0502020204030204" pitchFamily="34" charset="0"/>
+              </a:rPr>
               <a:t>GRASP Lab at </a:t>
             </a:r>
             <a:r>
-              <a:rPr lang="en-US" dirty="0" err="1" smtClean="0"/>
+              <a:rPr lang="en-US" dirty="0" err="1" smtClean="0">
+                <a:latin typeface="Calibri" panose="020F0502020204030204" pitchFamily="34" charset="0"/>
+              </a:rPr>
               <a:t>UPenn</a:t>
             </a:r>
             <a:r>
-              <a:rPr lang="en-US" dirty="0" smtClean="0"/>
+              <a:rPr lang="en-US" dirty="0" smtClean="0">
+                <a:latin typeface="Calibri" panose="020F0502020204030204" pitchFamily="34" charset="0"/>
+              </a:rPr>
               <a:t>:</a:t>
             </a:r>
           </a:p>
           <a:p>
-            <a:pPr lvl="2"/>
+            <a:pPr lvl="2">
+              <a:buFont typeface="Arial" panose="020B0604020202020204" pitchFamily="34" charset="0"/>
+              <a:buChar char="•"/>
+            </a:pPr>
             <a:r>
               <a:rPr lang="en-US" dirty="0" smtClean="0">
-                <a:hlinkClick r:id="rId4"/>
+                <a:latin typeface="Calibri" panose="020F0502020204030204" pitchFamily="34" charset="0"/>
+                <a:hlinkClick r:id="rId6"/>
               </a:rPr>
               <a:t>https</a:t>
             </a:r>
             <a:r>
               <a:rPr lang="en-US" dirty="0">
-                <a:hlinkClick r:id="rId4"/>
+                <a:latin typeface="Calibri" panose="020F0502020204030204" pitchFamily="34" charset="0"/>
+                <a:hlinkClick r:id="rId6"/>
               </a:rPr>
               <a:t>://</a:t>
             </a:r>
             <a:r>
               <a:rPr lang="en-US" dirty="0" smtClean="0">
-                <a:hlinkClick r:id="rId4"/>
+                <a:latin typeface="Calibri" panose="020F0502020204030204" pitchFamily="34" charset="0"/>
+                <a:hlinkClick r:id="rId6"/>
               </a:rPr>
               <a:t>www.youtube.com/watch?v=UQzuL60V9ng#t=27</a:t>
             </a:r>
-            <a:endParaRPr lang="en-US" dirty="0"/>
+            <a:endParaRPr lang="en-US" dirty="0">
+              <a:latin typeface="Calibri" panose="020F0502020204030204" pitchFamily="34" charset="0"/>
+            </a:endParaRPr>
           </a:p>
         </p:txBody>
       </p:sp>
@@ -9952,7 +10412,7 @@
   <p:timing>
     <p:tnLst>
       <p:par>
-        <p:cTn xmlns:p14="http://schemas.microsoft.com/office/powerpoint/2010/main" id="1" dur="indefinite" restart="never" nodeType="tmRoot"/>
+        <p:cTn id="1" dur="indefinite" restart="never" nodeType="tmRoot"/>
       </p:par>
     </p:tnLst>
   </p:timing>
@@ -9992,10 +10452,14 @@
           <a:lstStyle/>
           <a:p>
             <a:r>
-              <a:rPr lang="en-US" dirty="0" smtClean="0"/>
+              <a:rPr lang="en-US" dirty="0" smtClean="0">
+                <a:latin typeface="Calibri" panose="020F0502020204030204" pitchFamily="34" charset="0"/>
+              </a:rPr>
               <a:t>Simple Rules of Flocking</a:t>
             </a:r>
-            <a:endParaRPr lang="en-US" dirty="0"/>
+            <a:endParaRPr lang="en-US" dirty="0">
+              <a:latin typeface="Calibri" panose="020F0502020204030204" pitchFamily="34" charset="0"/>
+            </a:endParaRPr>
           </a:p>
         </p:txBody>
       </p:sp>
@@ -10016,50 +10480,91 @@
           </a:bodyPr>
           <a:lstStyle/>
           <a:p>
-            <a:r>
-              <a:rPr lang="en-US" sz="2400" dirty="0" smtClean="0"/>
+            <a:pPr>
+              <a:buFont typeface="Arial" panose="020B0604020202020204" pitchFamily="34" charset="0"/>
+              <a:buChar char="•"/>
+            </a:pPr>
+            <a:r>
+              <a:rPr lang="en-US" sz="2400" dirty="0" smtClean="0">
+                <a:latin typeface="Calibri" panose="020F0502020204030204" pitchFamily="34" charset="0"/>
+              </a:rPr>
               <a:t>Leaderless flock of agents</a:t>
             </a:r>
           </a:p>
           <a:p>
-            <a:r>
-              <a:rPr lang="en-US" sz="2400" dirty="0" smtClean="0"/>
+            <a:pPr>
+              <a:buFont typeface="Arial" panose="020B0604020202020204" pitchFamily="34" charset="0"/>
+              <a:buChar char="•"/>
+            </a:pPr>
+            <a:r>
+              <a:rPr lang="en-US" sz="2400" dirty="0" smtClean="0">
+                <a:latin typeface="Calibri" panose="020F0502020204030204" pitchFamily="34" charset="0"/>
+              </a:rPr>
               <a:t>Each agent calculates its movements independently</a:t>
             </a:r>
           </a:p>
           <a:p>
-            <a:r>
-              <a:rPr lang="en-US" sz="2400" dirty="0" smtClean="0"/>
+            <a:pPr>
+              <a:buFont typeface="Arial" panose="020B0604020202020204" pitchFamily="34" charset="0"/>
+              <a:buChar char="•"/>
+            </a:pPr>
+            <a:r>
+              <a:rPr lang="en-US" sz="2400" dirty="0" smtClean="0">
+                <a:latin typeface="Calibri" panose="020F0502020204030204" pitchFamily="34" charset="0"/>
+              </a:rPr>
               <a:t>Agents can only see a few agents around them, their “neighborhood”</a:t>
             </a:r>
           </a:p>
           <a:p>
-            <a:r>
-              <a:rPr lang="en-US" sz="2400" dirty="0" smtClean="0"/>
+            <a:pPr>
+              <a:buFont typeface="Arial" panose="020B0604020202020204" pitchFamily="34" charset="0"/>
+              <a:buChar char="•"/>
+            </a:pPr>
+            <a:r>
+              <a:rPr lang="en-US" sz="2400" dirty="0" smtClean="0">
+                <a:latin typeface="Calibri" panose="020F0502020204030204" pitchFamily="34" charset="0"/>
+              </a:rPr>
               <a:t>3 simple rules:</a:t>
             </a:r>
           </a:p>
           <a:p>
-            <a:pPr lvl="1"/>
-            <a:r>
-              <a:rPr lang="en-US" sz="2000" dirty="0" smtClean="0"/>
+            <a:pPr lvl="1">
+              <a:buFont typeface="Arial" panose="020B0604020202020204" pitchFamily="34" charset="0"/>
+              <a:buChar char="•"/>
+            </a:pPr>
+            <a:r>
+              <a:rPr lang="en-US" sz="2000" dirty="0" smtClean="0">
+                <a:latin typeface="Calibri" panose="020F0502020204030204" pitchFamily="34" charset="0"/>
+              </a:rPr>
               <a:t>Cohesion</a:t>
             </a:r>
           </a:p>
           <a:p>
-            <a:pPr lvl="1"/>
-            <a:r>
-              <a:rPr lang="en-US" sz="2000" dirty="0" smtClean="0"/>
+            <a:pPr lvl="1">
+              <a:buFont typeface="Arial" panose="020B0604020202020204" pitchFamily="34" charset="0"/>
+              <a:buChar char="•"/>
+            </a:pPr>
+            <a:r>
+              <a:rPr lang="en-US" sz="2000" dirty="0" smtClean="0">
+                <a:latin typeface="Calibri" panose="020F0502020204030204" pitchFamily="34" charset="0"/>
+              </a:rPr>
               <a:t>Alignment</a:t>
             </a:r>
           </a:p>
           <a:p>
-            <a:pPr lvl="1"/>
-            <a:r>
-              <a:rPr lang="en-US" sz="2000" dirty="0" smtClean="0"/>
+            <a:pPr lvl="1">
+              <a:buFont typeface="Arial" panose="020B0604020202020204" pitchFamily="34" charset="0"/>
+              <a:buChar char="•"/>
+            </a:pPr>
+            <a:r>
+              <a:rPr lang="en-US" sz="2000" dirty="0" smtClean="0">
+                <a:latin typeface="Calibri" panose="020F0502020204030204" pitchFamily="34" charset="0"/>
+              </a:rPr>
               <a:t>Separation</a:t>
             </a:r>
-            <a:endParaRPr lang="en-US" sz="2000" dirty="0"/>
+            <a:endParaRPr lang="en-US" sz="2000" dirty="0">
+              <a:latin typeface="Calibri" panose="020F0502020204030204" pitchFamily="34" charset="0"/>
+            </a:endParaRPr>
           </a:p>
         </p:txBody>
       </p:sp>
@@ -10076,7 +10581,7 @@
   <p:timing>
     <p:tnLst>
       <p:par>
-        <p:cTn xmlns:p14="http://schemas.microsoft.com/office/powerpoint/2010/main" id="1" dur="indefinite" restart="never" nodeType="tmRoot"/>
+        <p:cTn id="1" dur="indefinite" restart="never" nodeType="tmRoot"/>
       </p:par>
     </p:tnLst>
   </p:timing>
@@ -10116,10 +10621,14 @@
           <a:lstStyle/>
           <a:p>
             <a:r>
-              <a:rPr lang="en-US" dirty="0" smtClean="0"/>
+              <a:rPr lang="en-US" dirty="0" smtClean="0">
+                <a:latin typeface="Calibri" panose="020F0502020204030204" pitchFamily="34" charset="0"/>
+              </a:rPr>
               <a:t>Cohesion</a:t>
             </a:r>
-            <a:endParaRPr lang="en-US" dirty="0"/>
+            <a:endParaRPr lang="en-US" dirty="0">
+              <a:latin typeface="Calibri" panose="020F0502020204030204" pitchFamily="34" charset="0"/>
+            </a:endParaRPr>
           </a:p>
         </p:txBody>
       </p:sp>
@@ -10140,25 +10649,43 @@
           </a:bodyPr>
           <a:lstStyle/>
           <a:p>
-            <a:r>
-              <a:rPr lang="en-US" sz="2400" dirty="0" smtClean="0"/>
+            <a:pPr>
+              <a:buFont typeface="Arial" panose="020B0604020202020204" pitchFamily="34" charset="0"/>
+              <a:buChar char="•"/>
+            </a:pPr>
+            <a:r>
+              <a:rPr lang="en-US" sz="2400" dirty="0" smtClean="0">
+                <a:latin typeface="Calibri" panose="020F0502020204030204" pitchFamily="34" charset="0"/>
+              </a:rPr>
               <a:t>Each unit steers </a:t>
             </a:r>
             <a:r>
-              <a:rPr lang="en-US" sz="2400" dirty="0"/>
+              <a:rPr lang="en-US" sz="2400" dirty="0">
+                <a:latin typeface="Calibri" panose="020F0502020204030204" pitchFamily="34" charset="0"/>
+              </a:rPr>
               <a:t>towards the average position of its neighbors</a:t>
             </a:r>
           </a:p>
           <a:p>
-            <a:r>
-              <a:rPr lang="en-US" sz="2400" dirty="0"/>
+            <a:pPr>
+              <a:buFont typeface="Arial" panose="020B0604020202020204" pitchFamily="34" charset="0"/>
+              <a:buChar char="•"/>
+            </a:pPr>
+            <a:r>
+              <a:rPr lang="en-US" sz="2400" dirty="0">
+                <a:latin typeface="Calibri" panose="020F0502020204030204" pitchFamily="34" charset="0"/>
+              </a:rPr>
               <a:t>Units are attracted to one another as long as they are within </a:t>
             </a:r>
             <a:r>
-              <a:rPr lang="en-US" sz="2400" dirty="0" smtClean="0"/>
+              <a:rPr lang="en-US" sz="2400" dirty="0" smtClean="0">
+                <a:latin typeface="Calibri" panose="020F0502020204030204" pitchFamily="34" charset="0"/>
+              </a:rPr>
               <a:t>range</a:t>
             </a:r>
-            <a:endParaRPr lang="en-US" sz="2400" dirty="0"/>
+            <a:endParaRPr lang="en-US" sz="2400" dirty="0">
+              <a:latin typeface="Calibri" panose="020F0502020204030204" pitchFamily="34" charset="0"/>
+            </a:endParaRPr>
           </a:p>
         </p:txBody>
       </p:sp>
@@ -10201,7 +10728,7 @@
   <p:timing>
     <p:tnLst>
       <p:par>
-        <p:cTn xmlns:p14="http://schemas.microsoft.com/office/powerpoint/2010/main" id="1" dur="indefinite" restart="never" nodeType="tmRoot"/>
+        <p:cTn id="1" dur="indefinite" restart="never" nodeType="tmRoot"/>
       </p:par>
     </p:tnLst>
   </p:timing>
@@ -10241,10 +10768,14 @@
           <a:lstStyle/>
           <a:p>
             <a:r>
-              <a:rPr lang="en-US" dirty="0" smtClean="0"/>
+              <a:rPr lang="en-US" dirty="0" smtClean="0">
+                <a:latin typeface="Calibri" panose="020F0502020204030204" pitchFamily="34" charset="0"/>
+              </a:rPr>
               <a:t>Alignment</a:t>
             </a:r>
-            <a:endParaRPr lang="en-US" dirty="0"/>
+            <a:endParaRPr lang="en-US" dirty="0">
+              <a:latin typeface="Calibri" panose="020F0502020204030204" pitchFamily="34" charset="0"/>
+            </a:endParaRPr>
           </a:p>
         </p:txBody>
       </p:sp>
@@ -10265,37 +10796,58 @@
           </a:bodyPr>
           <a:lstStyle/>
           <a:p>
-            <a:r>
-              <a:rPr lang="en-MY" sz="2000" dirty="0" smtClean="0"/>
+            <a:pPr>
+              <a:buFont typeface="Arial" panose="020B0604020202020204" pitchFamily="34" charset="0"/>
+              <a:buChar char="•"/>
+            </a:pPr>
+            <a:r>
+              <a:rPr lang="en-MY" sz="2000" dirty="0" smtClean="0">
+                <a:latin typeface="Calibri" panose="020F0502020204030204" pitchFamily="34" charset="0"/>
+              </a:rPr>
               <a:t>Each unit steers </a:t>
             </a:r>
             <a:r>
-              <a:rPr lang="en-MY" sz="2000" dirty="0"/>
+              <a:rPr lang="en-MY" sz="2000" dirty="0">
+                <a:latin typeface="Calibri" panose="020F0502020204030204" pitchFamily="34" charset="0"/>
+              </a:rPr>
               <a:t>so as to align itself to the average heading of its </a:t>
             </a:r>
             <a:r>
-              <a:rPr lang="en-MY" sz="2000" dirty="0" err="1"/>
+              <a:rPr lang="en-MY" sz="2000" dirty="0" err="1" smtClean="0">
+                <a:latin typeface="Calibri" panose="020F0502020204030204" pitchFamily="34" charset="0"/>
+              </a:rPr>
               <a:t>neighbors</a:t>
             </a:r>
-            <a:r>
-              <a:rPr lang="en-MY" sz="2000" dirty="0"/>
-              <a:t>.</a:t>
-            </a:r>
-          </a:p>
-          <a:p>
-            <a:r>
-              <a:rPr lang="en-US" sz="2000" dirty="0" smtClean="0"/>
+            <a:endParaRPr lang="en-MY" sz="2000" dirty="0">
+              <a:latin typeface="Calibri" panose="020F0502020204030204" pitchFamily="34" charset="0"/>
+            </a:endParaRPr>
+          </a:p>
+          <a:p>
+            <a:pPr>
+              <a:buFont typeface="Arial" panose="020B0604020202020204" pitchFamily="34" charset="0"/>
+              <a:buChar char="•"/>
+            </a:pPr>
+            <a:r>
+              <a:rPr lang="en-US" sz="2000" dirty="0" smtClean="0">
+                <a:latin typeface="Calibri" panose="020F0502020204030204" pitchFamily="34" charset="0"/>
+              </a:rPr>
               <a:t>Matches </a:t>
             </a:r>
             <a:r>
-              <a:rPr lang="en-US" sz="2000" dirty="0"/>
+              <a:rPr lang="en-US" sz="2000" dirty="0">
+                <a:latin typeface="Calibri" panose="020F0502020204030204" pitchFamily="34" charset="0"/>
+              </a:rPr>
               <a:t>direction of units around it that it can </a:t>
             </a:r>
             <a:r>
-              <a:rPr lang="en-US" sz="2000" dirty="0" smtClean="0"/>
+              <a:rPr lang="en-US" sz="2000" dirty="0" smtClean="0">
+                <a:latin typeface="Calibri" panose="020F0502020204030204" pitchFamily="34" charset="0"/>
+              </a:rPr>
               <a:t>detect</a:t>
             </a:r>
-            <a:endParaRPr lang="en-US" sz="2000" dirty="0"/>
+            <a:endParaRPr lang="en-US" sz="2000" dirty="0">
+              <a:latin typeface="Calibri" panose="020F0502020204030204" pitchFamily="34" charset="0"/>
+            </a:endParaRPr>
           </a:p>
         </p:txBody>
       </p:sp>
@@ -10338,7 +10890,7 @@
   <p:timing>
     <p:tnLst>
       <p:par>
-        <p:cTn xmlns:p14="http://schemas.microsoft.com/office/powerpoint/2010/main" id="1" dur="indefinite" restart="never" nodeType="tmRoot"/>
+        <p:cTn id="1" dur="indefinite" restart="never" nodeType="tmRoot"/>
       </p:par>
     </p:tnLst>
   </p:timing>
@@ -10378,10 +10930,14 @@
           <a:lstStyle/>
           <a:p>
             <a:r>
-              <a:rPr lang="en-US" dirty="0" smtClean="0"/>
+              <a:rPr lang="en-US" dirty="0" smtClean="0">
+                <a:latin typeface="Calibri" panose="020F0502020204030204" pitchFamily="34" charset="0"/>
+              </a:rPr>
               <a:t>Separation</a:t>
             </a:r>
-            <a:endParaRPr lang="en-US" dirty="0"/>
+            <a:endParaRPr lang="en-US" dirty="0">
+              <a:latin typeface="Calibri" panose="020F0502020204030204" pitchFamily="34" charset="0"/>
+            </a:endParaRPr>
           </a:p>
         </p:txBody>
       </p:sp>
@@ -10402,50 +10958,85 @@
           </a:bodyPr>
           <a:lstStyle/>
           <a:p>
-            <a:r>
-              <a:rPr lang="en-MY" sz="2000" dirty="0" smtClean="0"/>
+            <a:pPr>
+              <a:buFont typeface="Arial" panose="020B0604020202020204" pitchFamily="34" charset="0"/>
+              <a:buChar char="•"/>
+            </a:pPr>
+            <a:r>
+              <a:rPr lang="en-MY" sz="2000" dirty="0" smtClean="0">
+                <a:latin typeface="Calibri" panose="020F0502020204030204" pitchFamily="34" charset="0"/>
+              </a:rPr>
               <a:t>Each unit steers </a:t>
             </a:r>
             <a:r>
-              <a:rPr lang="en-MY" sz="2000" dirty="0"/>
+              <a:rPr lang="en-MY" sz="2000" dirty="0">
+                <a:latin typeface="Calibri" panose="020F0502020204030204" pitchFamily="34" charset="0"/>
+              </a:rPr>
               <a:t>to avoid hitting its </a:t>
             </a:r>
             <a:r>
-              <a:rPr lang="en-MY" sz="2000" dirty="0" err="1"/>
+              <a:rPr lang="en-MY" sz="2000" dirty="0" err="1" smtClean="0">
+                <a:latin typeface="Calibri" panose="020F0502020204030204" pitchFamily="34" charset="0"/>
+              </a:rPr>
               <a:t>neighbors</a:t>
             </a:r>
-            <a:r>
-              <a:rPr lang="en-MY" sz="2000" dirty="0"/>
-              <a:t>.</a:t>
-            </a:r>
-          </a:p>
-          <a:p>
-            <a:r>
-              <a:rPr lang="en-US" sz="2000" dirty="0"/>
+            <a:endParaRPr lang="en-MY" sz="2000" dirty="0">
+              <a:latin typeface="Calibri" panose="020F0502020204030204" pitchFamily="34" charset="0"/>
+            </a:endParaRPr>
+          </a:p>
+          <a:p>
+            <a:pPr>
+              <a:buFont typeface="Arial" panose="020B0604020202020204" pitchFamily="34" charset="0"/>
+              <a:buChar char="•"/>
+            </a:pPr>
+            <a:r>
+              <a:rPr lang="en-US" sz="2000" dirty="0">
+                <a:latin typeface="Calibri" panose="020F0502020204030204" pitchFamily="34" charset="0"/>
+              </a:rPr>
               <a:t>Units are repelled by non-member units or obstacles. Repel effect </a:t>
             </a:r>
             <a:r>
-              <a:rPr lang="en-US" sz="2000" dirty="0" smtClean="0"/>
+              <a:rPr lang="en-US" sz="2000" dirty="0" smtClean="0">
+                <a:latin typeface="Calibri" panose="020F0502020204030204" pitchFamily="34" charset="0"/>
+              </a:rPr>
               <a:t>can be </a:t>
             </a:r>
             <a:r>
-              <a:rPr lang="en-US" sz="2000" dirty="0"/>
+              <a:rPr lang="en-US" sz="2000" dirty="0">
+                <a:latin typeface="Calibri" panose="020F0502020204030204" pitchFamily="34" charset="0"/>
+              </a:rPr>
               <a:t>inversely </a:t>
             </a:r>
             <a:r>
-              <a:rPr lang="en-US" sz="2000" dirty="0" smtClean="0"/>
+              <a:rPr lang="en-US" sz="2000" dirty="0" smtClean="0">
+                <a:latin typeface="Calibri" panose="020F0502020204030204" pitchFamily="34" charset="0"/>
+              </a:rPr>
               <a:t>proportional </a:t>
             </a:r>
             <a:r>
-              <a:rPr lang="en-US" sz="2000" dirty="0"/>
+              <a:rPr lang="en-US" sz="2000" dirty="0">
+                <a:latin typeface="Calibri" panose="020F0502020204030204" pitchFamily="34" charset="0"/>
+              </a:rPr>
               <a:t>to distance from unit</a:t>
             </a:r>
           </a:p>
           <a:p>
-            <a:endParaRPr lang="en-MY" sz="2000" dirty="0"/>
-          </a:p>
-          <a:p>
-            <a:endParaRPr lang="en-US" sz="2000" dirty="0"/>
+            <a:pPr>
+              <a:buFont typeface="Arial" panose="020B0604020202020204" pitchFamily="34" charset="0"/>
+              <a:buChar char="•"/>
+            </a:pPr>
+            <a:endParaRPr lang="en-MY" sz="2000" dirty="0">
+              <a:latin typeface="Calibri" panose="020F0502020204030204" pitchFamily="34" charset="0"/>
+            </a:endParaRPr>
+          </a:p>
+          <a:p>
+            <a:pPr>
+              <a:buFont typeface="Arial" panose="020B0604020202020204" pitchFamily="34" charset="0"/>
+              <a:buChar char="•"/>
+            </a:pPr>
+            <a:endParaRPr lang="en-US" sz="2000" dirty="0">
+              <a:latin typeface="Calibri" panose="020F0502020204030204" pitchFamily="34" charset="0"/>
+            </a:endParaRPr>
           </a:p>
         </p:txBody>
       </p:sp>
@@ -10488,7 +11079,7 @@
   <p:timing>
     <p:tnLst>
       <p:par>
-        <p:cTn xmlns:p14="http://schemas.microsoft.com/office/powerpoint/2010/main" id="1" dur="indefinite" restart="never" nodeType="tmRoot"/>
+        <p:cTn id="1" dur="indefinite" restart="never" nodeType="tmRoot"/>
       </p:par>
     </p:tnLst>
   </p:timing>

</xml_diff>

<commit_message>
Minor improvements to presentation and antagonist avoidance logic.
</commit_message>
<xml_diff>
--- a/flocking.pptx
+++ b/flocking.pptx
@@ -124,7 +124,18 @@
   </p:defaultTextStyle>
   <p:extLst>
     <p:ext uri="{EFAFB233-063F-42B5-8137-9DF3F51BA10A}">
-      <p15:sldGuideLst xmlns:p15="http://schemas.microsoft.com/office/powerpoint/2012/main" xmlns=""/>
+      <p15:sldGuideLst xmlns:p15="http://schemas.microsoft.com/office/powerpoint/2012/main">
+        <p15:guide id="1" orient="horz" pos="2160">
+          <p15:clr>
+            <a:srgbClr val="A4A3A4"/>
+          </p15:clr>
+        </p15:guide>
+        <p15:guide id="2" pos="3840">
+          <p15:clr>
+            <a:srgbClr val="A4A3A4"/>
+          </p15:clr>
+        </p15:guide>
+      </p15:sldGuideLst>
     </p:ext>
   </p:extLst>
 </p:presentation>
@@ -319,7 +330,7 @@
             <a:fld id="{B61BEF0D-F0BB-DE4B-95CE-6DB70DBA9567}" type="datetimeFigureOut">
               <a:rPr lang="en-US" smtClean="0"/>
               <a:pPr/>
-              <a:t>5/23/2015</a:t>
+              <a:t>6/3/2016</a:t>
             </a:fld>
             <a:endParaRPr lang="en-US" dirty="0"/>
           </a:p>
@@ -659,7 +670,7 @@
             <a:fld id="{B61BEF0D-F0BB-DE4B-95CE-6DB70DBA9567}" type="datetimeFigureOut">
               <a:rPr lang="en-US" smtClean="0"/>
               <a:pPr/>
-              <a:t>5/23/2015</a:t>
+              <a:t>6/3/2016</a:t>
             </a:fld>
             <a:endParaRPr lang="en-US" dirty="0"/>
           </a:p>
@@ -1062,7 +1073,7 @@
             <a:fld id="{B61BEF0D-F0BB-DE4B-95CE-6DB70DBA9567}" type="datetimeFigureOut">
               <a:rPr lang="en-US" smtClean="0"/>
               <a:pPr/>
-              <a:t>5/23/2015</a:t>
+              <a:t>6/3/2016</a:t>
             </a:fld>
             <a:endParaRPr lang="en-US" dirty="0"/>
           </a:p>
@@ -1400,7 +1411,7 @@
             <a:fld id="{B61BEF0D-F0BB-DE4B-95CE-6DB70DBA9567}" type="datetimeFigureOut">
               <a:rPr lang="en-US" smtClean="0"/>
               <a:pPr/>
-              <a:t>5/23/2015</a:t>
+              <a:t>6/3/2016</a:t>
             </a:fld>
             <a:endParaRPr lang="en-US" dirty="0"/>
           </a:p>
@@ -1722,7 +1733,7 @@
             <a:fld id="{B61BEF0D-F0BB-DE4B-95CE-6DB70DBA9567}" type="datetimeFigureOut">
               <a:rPr lang="en-US" smtClean="0"/>
               <a:pPr/>
-              <a:t>5/23/2015</a:t>
+              <a:t>6/3/2016</a:t>
             </a:fld>
             <a:endParaRPr lang="en-US" dirty="0"/>
           </a:p>
@@ -2120,7 +2131,7 @@
             <a:fld id="{B61BEF0D-F0BB-DE4B-95CE-6DB70DBA9567}" type="datetimeFigureOut">
               <a:rPr lang="en-US" smtClean="0"/>
               <a:pPr/>
-              <a:t>5/23/2015</a:t>
+              <a:t>6/3/2016</a:t>
             </a:fld>
             <a:endParaRPr lang="en-US" dirty="0"/>
           </a:p>
@@ -2379,7 +2390,7 @@
             <a:fld id="{B61BEF0D-F0BB-DE4B-95CE-6DB70DBA9567}" type="datetimeFigureOut">
               <a:rPr lang="en-US" smtClean="0"/>
               <a:pPr/>
-              <a:t>5/23/2015</a:t>
+              <a:t>6/3/2016</a:t>
             </a:fld>
             <a:endParaRPr lang="en-US" dirty="0"/>
           </a:p>
@@ -2643,7 +2654,7 @@
             <a:fld id="{B61BEF0D-F0BB-DE4B-95CE-6DB70DBA9567}" type="datetimeFigureOut">
               <a:rPr lang="en-US" smtClean="0"/>
               <a:pPr/>
-              <a:t>5/23/2015</a:t>
+              <a:t>6/3/2016</a:t>
             </a:fld>
             <a:endParaRPr lang="en-US" dirty="0"/>
           </a:p>
@@ -2907,7 +2918,7 @@
             <a:fld id="{B61BEF0D-F0BB-DE4B-95CE-6DB70DBA9567}" type="datetimeFigureOut">
               <a:rPr lang="en-US" smtClean="0"/>
               <a:pPr/>
-              <a:t>5/23/2015</a:t>
+              <a:t>6/3/2016</a:t>
             </a:fld>
             <a:endParaRPr lang="en-US" dirty="0"/>
           </a:p>
@@ -3238,7 +3249,7 @@
             <a:fld id="{B61BEF0D-F0BB-DE4B-95CE-6DB70DBA9567}" type="datetimeFigureOut">
               <a:rPr lang="en-US" smtClean="0"/>
               <a:pPr/>
-              <a:t>5/23/2015</a:t>
+              <a:t>6/3/2016</a:t>
             </a:fld>
             <a:endParaRPr lang="en-US" dirty="0"/>
           </a:p>
@@ -3563,7 +3574,7 @@
             <a:fld id="{B61BEF0D-F0BB-DE4B-95CE-6DB70DBA9567}" type="datetimeFigureOut">
               <a:rPr lang="en-US" smtClean="0"/>
               <a:pPr/>
-              <a:t>5/23/2015</a:t>
+              <a:t>6/3/2016</a:t>
             </a:fld>
             <a:endParaRPr lang="en-US" dirty="0"/>
           </a:p>
@@ -4022,7 +4033,7 @@
             <a:fld id="{B61BEF0D-F0BB-DE4B-95CE-6DB70DBA9567}" type="datetimeFigureOut">
               <a:rPr lang="en-US" smtClean="0"/>
               <a:pPr/>
-              <a:t>5/23/2015</a:t>
+              <a:t>6/3/2016</a:t>
             </a:fld>
             <a:endParaRPr lang="en-US" dirty="0"/>
           </a:p>
@@ -4229,7 +4240,7 @@
             <a:fld id="{B61BEF0D-F0BB-DE4B-95CE-6DB70DBA9567}" type="datetimeFigureOut">
               <a:rPr lang="en-US" smtClean="0"/>
               <a:pPr/>
-              <a:t>5/23/2015</a:t>
+              <a:t>6/3/2016</a:t>
             </a:fld>
             <a:endParaRPr lang="en-US" dirty="0"/>
           </a:p>
@@ -4408,7 +4419,7 @@
             <a:fld id="{B61BEF0D-F0BB-DE4B-95CE-6DB70DBA9567}" type="datetimeFigureOut">
               <a:rPr lang="en-US" smtClean="0"/>
               <a:pPr/>
-              <a:t>5/23/2015</a:t>
+              <a:t>6/3/2016</a:t>
             </a:fld>
             <a:endParaRPr lang="en-US" dirty="0"/>
           </a:p>
@@ -4743,7 +4754,7 @@
             <a:fld id="{B61BEF0D-F0BB-DE4B-95CE-6DB70DBA9567}" type="datetimeFigureOut">
               <a:rPr lang="en-US" smtClean="0"/>
               <a:pPr/>
-              <a:t>5/23/2015</a:t>
+              <a:t>6/3/2016</a:t>
             </a:fld>
             <a:endParaRPr lang="en-US" dirty="0"/>
           </a:p>
@@ -5090,7 +5101,7 @@
             <a:fld id="{B61BEF0D-F0BB-DE4B-95CE-6DB70DBA9567}" type="datetimeFigureOut">
               <a:rPr lang="en-US" smtClean="0"/>
               <a:pPr/>
-              <a:t>5/23/2015</a:t>
+              <a:t>6/3/2016</a:t>
             </a:fld>
             <a:endParaRPr lang="en-US" dirty="0"/>
           </a:p>
@@ -7209,7 +7220,7 @@
             <a:fld id="{B61BEF0D-F0BB-DE4B-95CE-6DB70DBA9567}" type="datetimeFigureOut">
               <a:rPr lang="en-US" smtClean="0"/>
               <a:pPr/>
-              <a:t>5/23/2015</a:t>
+              <a:t>6/3/2016</a:t>
             </a:fld>
             <a:endParaRPr lang="en-US" dirty="0"/>
           </a:p>
@@ -9237,48 +9248,6 @@
               <a:buFont typeface="Arial" panose="020B0604020202020204" pitchFamily="34" charset="0"/>
               <a:buChar char="•"/>
             </a:pPr>
-            <a:r>
-              <a:rPr lang="en-US" dirty="0">
-                <a:hlinkClick r:id="rId2"/>
-              </a:rPr>
-              <a:t>https://</a:t>
-            </a:r>
-            <a:r>
-              <a:rPr lang="en-US" dirty="0" smtClean="0">
-                <a:hlinkClick r:id="rId2"/>
-              </a:rPr>
-              <a:t>youtu.be/ipgdxQoVXWA</a:t>
-            </a:r>
-          </a:p>
-          <a:p>
-            <a:pPr>
-              <a:buFont typeface="Arial" panose="020B0604020202020204" pitchFamily="34" charset="0"/>
-              <a:buChar char="•"/>
-            </a:pPr>
-            <a:r>
-              <a:rPr lang="en-US" dirty="0">
-                <a:latin typeface="Calibri" panose="020F0502020204030204" pitchFamily="34" charset="0"/>
-              </a:rPr>
-              <a:t>Note how the flocking pink agents respond to the presence of the single green agent, once it appears</a:t>
-            </a:r>
-            <a:r>
-              <a:rPr lang="en-US" dirty="0" smtClean="0">
-                <a:latin typeface="Calibri" panose="020F0502020204030204" pitchFamily="34" charset="0"/>
-              </a:rPr>
-              <a:t>.</a:t>
-            </a:r>
-          </a:p>
-          <a:p>
-            <a:pPr>
-              <a:buFont typeface="Arial" panose="020B0604020202020204" pitchFamily="34" charset="0"/>
-              <a:buChar char="•"/>
-            </a:pPr>
-            <a:r>
-              <a:rPr lang="en-US" dirty="0" smtClean="0">
-                <a:latin typeface="Calibri" panose="020F0502020204030204" pitchFamily="34" charset="0"/>
-              </a:rPr>
-              <a:t>(Sorry about the video capture quality!)</a:t>
-            </a:r>
             <a:endParaRPr lang="en-US" dirty="0">
               <a:latin typeface="Calibri" panose="020F0502020204030204" pitchFamily="34" charset="0"/>
             </a:endParaRPr>
@@ -10202,7 +10171,7 @@
         <p:spPr/>
         <p:txBody>
           <a:bodyPr>
-            <a:normAutofit fontScale="92500" lnSpcReduction="10000"/>
+            <a:normAutofit/>
           </a:bodyPr>
           <a:lstStyle/>
           <a:p>
@@ -10293,7 +10262,13 @@
               <a:rPr lang="en-US" dirty="0" smtClean="0">
                 <a:latin typeface="Calibri" panose="020F0502020204030204" pitchFamily="34" charset="0"/>
               </a:rPr>
-              <a:t>Assassin’s Creed (various)</a:t>
+              <a:t>Lord </a:t>
+            </a:r>
+            <a:r>
+              <a:rPr lang="en-US" dirty="0" smtClean="0">
+                <a:latin typeface="Calibri" panose="020F0502020204030204" pitchFamily="34" charset="0"/>
+              </a:rPr>
+              <a:t>of the Rings: The Return of the King (2003)</a:t>
             </a:r>
           </a:p>
           <a:p>
@@ -10302,20 +10277,20 @@
               <a:buChar char="•"/>
             </a:pPr>
             <a:r>
-              <a:rPr lang="en-US" dirty="0">
+              <a:rPr lang="en-US" sz="1500" dirty="0">
                 <a:latin typeface="Calibri" panose="020F0502020204030204" pitchFamily="34" charset="0"/>
                 <a:hlinkClick r:id="rId5"/>
               </a:rPr>
               <a:t>https://</a:t>
             </a:r>
             <a:r>
-              <a:rPr lang="en-US" dirty="0" smtClean="0">
+              <a:rPr lang="en-US" sz="1500" dirty="0" smtClean="0">
                 <a:latin typeface="Calibri" panose="020F0502020204030204" pitchFamily="34" charset="0"/>
                 <a:hlinkClick r:id="rId5"/>
               </a:rPr>
-              <a:t>www.youtube.com/watch?v=ACWIRMePpxk#t=597</a:t>
-            </a:r>
-            <a:endParaRPr lang="en-US" dirty="0" smtClean="0">
+              <a:t>youtu.be/EmTz7EAYLrs?t=313</a:t>
+            </a:r>
+            <a:endParaRPr lang="en-US" sz="1500" dirty="0">
               <a:latin typeface="Calibri" panose="020F0502020204030204" pitchFamily="34" charset="0"/>
             </a:endParaRPr>
           </a:p>
@@ -10340,58 +10315,13 @@
               <a:rPr lang="en-US" dirty="0" smtClean="0">
                 <a:latin typeface="Calibri" panose="020F0502020204030204" pitchFamily="34" charset="0"/>
               </a:rPr>
-              <a:t>Autonomous robotics:</a:t>
-            </a:r>
-          </a:p>
-          <a:p>
-            <a:pPr lvl="1">
-              <a:buFont typeface="Arial" panose="020B0604020202020204" pitchFamily="34" charset="0"/>
-              <a:buChar char="•"/>
-            </a:pPr>
+              <a:t>Autonomous </a:t>
+            </a:r>
             <a:r>
               <a:rPr lang="en-US" dirty="0" smtClean="0">
                 <a:latin typeface="Calibri" panose="020F0502020204030204" pitchFamily="34" charset="0"/>
               </a:rPr>
-              <a:t>GRASP Lab at </a:t>
-            </a:r>
-            <a:r>
-              <a:rPr lang="en-US" dirty="0" err="1" smtClean="0">
-                <a:latin typeface="Calibri" panose="020F0502020204030204" pitchFamily="34" charset="0"/>
-              </a:rPr>
-              <a:t>UPenn</a:t>
-            </a:r>
-            <a:r>
-              <a:rPr lang="en-US" dirty="0" smtClean="0">
-                <a:latin typeface="Calibri" panose="020F0502020204030204" pitchFamily="34" charset="0"/>
-              </a:rPr>
-              <a:t>:</a:t>
-            </a:r>
-          </a:p>
-          <a:p>
-            <a:pPr lvl="2">
-              <a:buFont typeface="Arial" panose="020B0604020202020204" pitchFamily="34" charset="0"/>
-              <a:buChar char="•"/>
-            </a:pPr>
-            <a:r>
-              <a:rPr lang="en-US" dirty="0" smtClean="0">
-                <a:latin typeface="Calibri" panose="020F0502020204030204" pitchFamily="34" charset="0"/>
-                <a:hlinkClick r:id="rId6"/>
-              </a:rPr>
-              <a:t>https</a:t>
-            </a:r>
-            <a:r>
-              <a:rPr lang="en-US" dirty="0">
-                <a:latin typeface="Calibri" panose="020F0502020204030204" pitchFamily="34" charset="0"/>
-                <a:hlinkClick r:id="rId6"/>
-              </a:rPr>
-              <a:t>://</a:t>
-            </a:r>
-            <a:r>
-              <a:rPr lang="en-US" dirty="0" smtClean="0">
-                <a:latin typeface="Calibri" panose="020F0502020204030204" pitchFamily="34" charset="0"/>
-                <a:hlinkClick r:id="rId6"/>
-              </a:rPr>
-              <a:t>www.youtube.com/watch?v=UQzuL60V9ng#t=27</a:t>
+              <a:t>robotics</a:t>
             </a:r>
             <a:endParaRPr lang="en-US" dirty="0">
               <a:latin typeface="Calibri" panose="020F0502020204030204" pitchFamily="34" charset="0"/>
@@ -11323,7 +11253,7 @@
   <a:extraClrSchemeLst/>
   <a:extLst>
     <a:ext uri="{05A4C25C-085E-4340-85A3-A5531E510DB2}">
-      <thm15:themeFamily xmlns:thm15="http://schemas.microsoft.com/office/thememl/2012/main" xmlns="" name="Wisp" id="{7CB32D59-10C0-40DD-B7BD-2E94284A981C}" vid="{24B1A44C-C006-48B2-A4D7-E5549B3D8CD4}"/>
+      <thm15:themeFamily xmlns:thm15="http://schemas.microsoft.com/office/thememl/2012/main" name="Wisp" id="{7CB32D59-10C0-40DD-B7BD-2E94284A981C}" vid="{24B1A44C-C006-48B2-A4D7-E5549B3D8CD4}"/>
     </a:ext>
   </a:extLst>
 </a:theme>

</xml_diff>

<commit_message>
Updated links in presentation.
</commit_message>
<xml_diff>
--- a/flocking.pptx
+++ b/flocking.pptx
@@ -7913,41 +7913,20 @@
               <a:buChar char="•"/>
             </a:pPr>
             <a:r>
-              <a:rPr lang="en-US" sz="2400" dirty="0">
+              <a:rPr lang="en-US" sz="1600" dirty="0">
                 <a:latin typeface="Calibri" panose="020F0502020204030204" pitchFamily="34" charset="0"/>
                 <a:hlinkClick r:id="rId2"/>
               </a:rPr>
               <a:t>https://</a:t>
             </a:r>
             <a:r>
-              <a:rPr lang="en-US" sz="2400" dirty="0" err="1">
+              <a:rPr lang="en-US" sz="1600" dirty="0" smtClean="0">
                 <a:latin typeface="Calibri" panose="020F0502020204030204" pitchFamily="34" charset="0"/>
                 <a:hlinkClick r:id="rId2"/>
               </a:rPr>
-              <a:t>www.youtube.com</a:t>
-            </a:r>
-            <a:r>
-              <a:rPr lang="en-US" sz="2400" dirty="0">
-                <a:latin typeface="Calibri" panose="020F0502020204030204" pitchFamily="34" charset="0"/>
-                <a:hlinkClick r:id="rId2"/>
-              </a:rPr>
-              <a:t>/</a:t>
-            </a:r>
-            <a:r>
-              <a:rPr lang="en-US" sz="2400" dirty="0" err="1">
-                <a:latin typeface="Calibri" panose="020F0502020204030204" pitchFamily="34" charset="0"/>
-                <a:hlinkClick r:id="rId2"/>
-              </a:rPr>
-              <a:t>watch?v</a:t>
-            </a:r>
-            <a:r>
-              <a:rPr lang="en-US" sz="2400" dirty="0">
-                <a:latin typeface="Calibri" panose="020F0502020204030204" pitchFamily="34" charset="0"/>
-                <a:hlinkClick r:id="rId2"/>
-              </a:rPr>
-              <a:t>=r1m6IKiO26c#t=82</a:t>
-            </a:r>
-            <a:endParaRPr lang="en-US" sz="2400" dirty="0">
+              <a:t>youtu.be/CeVeQ8cS5wA?t=89</a:t>
+            </a:r>
+            <a:endParaRPr lang="en-US" sz="1600" dirty="0" smtClean="0">
               <a:latin typeface="Calibri" panose="020F0502020204030204" pitchFamily="34" charset="0"/>
             </a:endParaRPr>
           </a:p>
@@ -9229,31 +9208,6 @@
           </a:p>
         </p:txBody>
       </p:sp>
-      <p:sp>
-        <p:nvSpPr>
-          <p:cNvPr id="3" name="Content Placeholder 2"/>
-          <p:cNvSpPr>
-            <a:spLocks noGrp="1"/>
-          </p:cNvSpPr>
-          <p:nvPr>
-            <p:ph idx="1"/>
-          </p:nvPr>
-        </p:nvSpPr>
-        <p:spPr/>
-        <p:txBody>
-          <a:bodyPr/>
-          <a:lstStyle/>
-          <a:p>
-            <a:pPr>
-              <a:buFont typeface="Arial" panose="020B0604020202020204" pitchFamily="34" charset="0"/>
-              <a:buChar char="•"/>
-            </a:pPr>
-            <a:endParaRPr lang="en-US" dirty="0">
-              <a:latin typeface="Calibri" panose="020F0502020204030204" pitchFamily="34" charset="0"/>
-            </a:endParaRPr>
-          </a:p>
-        </p:txBody>
-      </p:sp>
     </p:spTree>
     <p:extLst>
       <p:ext uri="{BB962C8B-B14F-4D97-AF65-F5344CB8AC3E}">
@@ -9482,7 +9436,13 @@
               <a:rPr lang="en-US" dirty="0" smtClean="0">
                 <a:latin typeface="Calibri" panose="020F0502020204030204" pitchFamily="34" charset="0"/>
               </a:rPr>
-              <a:t>Birds in flocks, fish in schools, land animals in herds</a:t>
+              <a:t>Birds in flocks, fish in schools, land animals in </a:t>
+            </a:r>
+            <a:r>
+              <a:rPr lang="en-US" dirty="0" smtClean="0">
+                <a:latin typeface="Calibri" panose="020F0502020204030204" pitchFamily="34" charset="0"/>
+              </a:rPr>
+              <a:t>herds</a:t>
             </a:r>
           </a:p>
           <a:p>
@@ -9491,16 +9451,16 @@
               <a:buChar char="•"/>
             </a:pPr>
             <a:r>
-              <a:rPr lang="en-US" dirty="0" err="1" smtClean="0">
-                <a:latin typeface="Calibri" panose="020F0502020204030204" pitchFamily="34" charset="0"/>
-              </a:rPr>
-              <a:t>Murmuration</a:t>
+              <a:rPr lang="en-US" dirty="0">
+                <a:latin typeface="Calibri" panose="020F0502020204030204" pitchFamily="34" charset="0"/>
+              </a:rPr>
+              <a:t>Jurassic Park (1993</a:t>
             </a:r>
             <a:r>
               <a:rPr lang="en-US" dirty="0" smtClean="0">
                 <a:latin typeface="Calibri" panose="020F0502020204030204" pitchFamily="34" charset="0"/>
               </a:rPr>
-              <a:t> of starlings:</a:t>
+              <a:t>)</a:t>
             </a:r>
           </a:p>
           <a:p>
@@ -9509,16 +9469,57 @@
               <a:buChar char="•"/>
             </a:pPr>
             <a:r>
+              <a:rPr lang="en-US" sz="1400" dirty="0" smtClean="0">
+                <a:latin typeface="Calibri" panose="020F0502020204030204" pitchFamily="34" charset="0"/>
+                <a:hlinkClick r:id="rId2"/>
+              </a:rPr>
+              <a:t>https://youtu.be/nM-RPO10aPY?t=13</a:t>
+            </a:r>
+            <a:endParaRPr lang="en-US" sz="1400" dirty="0" smtClean="0">
+              <a:latin typeface="Calibri" panose="020F0502020204030204" pitchFamily="34" charset="0"/>
+            </a:endParaRPr>
+          </a:p>
+          <a:p>
+            <a:pPr>
+              <a:buFont typeface="Arial" panose="020B0604020202020204" pitchFamily="34" charset="0"/>
+              <a:buChar char="•"/>
+            </a:pPr>
+            <a:r>
+              <a:rPr lang="en-US" dirty="0" err="1" smtClean="0">
+                <a:latin typeface="Calibri" panose="020F0502020204030204" pitchFamily="34" charset="0"/>
+              </a:rPr>
+              <a:t>Murmuration</a:t>
+            </a:r>
+            <a:r>
+              <a:rPr lang="en-US" dirty="0" smtClean="0">
+                <a:latin typeface="Calibri" panose="020F0502020204030204" pitchFamily="34" charset="0"/>
+              </a:rPr>
+              <a:t> of starlings:</a:t>
+            </a:r>
+          </a:p>
+          <a:p>
+            <a:pPr lvl="1">
+              <a:buFont typeface="Arial" panose="020B0604020202020204" pitchFamily="34" charset="0"/>
+              <a:buChar char="•"/>
+            </a:pPr>
+            <a:r>
+              <a:rPr lang="en-US" dirty="0" smtClean="0">
+                <a:latin typeface="Calibri" panose="020F0502020204030204" pitchFamily="34" charset="0"/>
+                <a:hlinkClick r:id="rId3"/>
+              </a:rPr>
+              <a:t>https</a:t>
+            </a:r>
+            <a:r>
               <a:rPr lang="en-US" dirty="0">
                 <a:latin typeface="Calibri" panose="020F0502020204030204" pitchFamily="34" charset="0"/>
-                <a:hlinkClick r:id="rId2"/>
-              </a:rPr>
-              <a:t>https://</a:t>
+                <a:hlinkClick r:id="rId3"/>
+              </a:rPr>
+              <a:t>://</a:t>
             </a:r>
             <a:r>
               <a:rPr lang="en-US" dirty="0" smtClean="0">
                 <a:latin typeface="Calibri" panose="020F0502020204030204" pitchFamily="34" charset="0"/>
-                <a:hlinkClick r:id="rId2"/>
+                <a:hlinkClick r:id="rId3"/>
               </a:rPr>
               <a:t>www.youtube.com/watch?v=eakKfY5aHmY</a:t>
             </a:r>
@@ -10203,20 +10204,37 @@
             </a:endParaRPr>
           </a:p>
           <a:p>
+            <a:pPr>
+              <a:buFont typeface="Arial" panose="020B0604020202020204" pitchFamily="34" charset="0"/>
+              <a:buChar char="•"/>
+            </a:pPr>
+            <a:r>
+              <a:rPr lang="en-US" dirty="0" smtClean="0">
+                <a:latin typeface="Calibri" panose="020F0502020204030204" pitchFamily="34" charset="0"/>
+              </a:rPr>
+              <a:t>Lion King: Wildebeest stampede (1994)</a:t>
+            </a:r>
+          </a:p>
+          <a:p>
             <a:pPr lvl="1">
               <a:buFont typeface="Arial" panose="020B0604020202020204" pitchFamily="34" charset="0"/>
               <a:buChar char="•"/>
             </a:pPr>
             <a:r>
-              <a:rPr lang="en-US" dirty="0">
+              <a:rPr lang="en-US" sz="1400" dirty="0">
                 <a:latin typeface="Calibri" panose="020F0502020204030204" pitchFamily="34" charset="0"/>
                 <a:hlinkClick r:id="rId3"/>
               </a:rPr>
-              <a:t>https://youtu.be/jCVwdeAobYc?t=15</a:t>
-            </a:r>
-            <a:endParaRPr lang="en-US" dirty="0" smtClean="0">
-              <a:latin typeface="Calibri" panose="020F0502020204030204" pitchFamily="34" charset="0"/>
-            </a:endParaRPr>
+              <a:t>https://</a:t>
+            </a:r>
+            <a:r>
+              <a:rPr lang="en-US" sz="1400" dirty="0" smtClean="0">
+                <a:latin typeface="Calibri" panose="020F0502020204030204" pitchFamily="34" charset="0"/>
+                <a:hlinkClick r:id="rId3"/>
+              </a:rPr>
+              <a:t>youtu.be/axDZalxEdi8?t=50</a:t>
+            </a:r>
+            <a:endParaRPr lang="en-US" dirty="0"/>
           </a:p>
           <a:p>
             <a:pPr>
@@ -10227,7 +10245,7 @@
               <a:rPr lang="en-US" dirty="0" smtClean="0">
                 <a:latin typeface="Calibri" panose="020F0502020204030204" pitchFamily="34" charset="0"/>
               </a:rPr>
-              <a:t>Jurassic Park (1993)</a:t>
+              <a:t>Lord of the Rings: The Return of the King (2003)</a:t>
             </a:r>
           </a:p>
           <a:p>
@@ -10236,57 +10254,23 @@
               <a:buChar char="•"/>
             </a:pPr>
             <a:r>
-              <a:rPr lang="en-US" dirty="0">
+              <a:rPr lang="en-US" sz="1500" dirty="0" smtClean="0">
                 <a:latin typeface="Calibri" panose="020F0502020204030204" pitchFamily="34" charset="0"/>
                 <a:hlinkClick r:id="rId4"/>
               </a:rPr>
-              <a:t>https://</a:t>
-            </a:r>
-            <a:r>
-              <a:rPr lang="en-US" dirty="0" smtClean="0">
+              <a:t>https</a:t>
+            </a:r>
+            <a:r>
+              <a:rPr lang="en-US" sz="1500" dirty="0">
                 <a:latin typeface="Calibri" panose="020F0502020204030204" pitchFamily="34" charset="0"/>
                 <a:hlinkClick r:id="rId4"/>
               </a:rPr>
-              <a:t>www.youtube.com/watch?v=nM-RPO10aPY</a:t>
-            </a:r>
-            <a:endParaRPr lang="en-US" dirty="0" smtClean="0">
-              <a:latin typeface="Calibri" panose="020F0502020204030204" pitchFamily="34" charset="0"/>
-            </a:endParaRPr>
-          </a:p>
-          <a:p>
-            <a:pPr>
-              <a:buFont typeface="Arial" panose="020B0604020202020204" pitchFamily="34" charset="0"/>
-              <a:buChar char="•"/>
-            </a:pPr>
-            <a:r>
-              <a:rPr lang="en-US" dirty="0" smtClean="0">
-                <a:latin typeface="Calibri" panose="020F0502020204030204" pitchFamily="34" charset="0"/>
-              </a:rPr>
-              <a:t>Lord </a:t>
-            </a:r>
-            <a:r>
-              <a:rPr lang="en-US" dirty="0" smtClean="0">
-                <a:latin typeface="Calibri" panose="020F0502020204030204" pitchFamily="34" charset="0"/>
-              </a:rPr>
-              <a:t>of the Rings: The Return of the King (2003)</a:t>
-            </a:r>
-          </a:p>
-          <a:p>
-            <a:pPr lvl="1">
-              <a:buFont typeface="Arial" panose="020B0604020202020204" pitchFamily="34" charset="0"/>
-              <a:buChar char="•"/>
-            </a:pPr>
-            <a:r>
-              <a:rPr lang="en-US" sz="1500" dirty="0">
-                <a:latin typeface="Calibri" panose="020F0502020204030204" pitchFamily="34" charset="0"/>
-                <a:hlinkClick r:id="rId5"/>
-              </a:rPr>
-              <a:t>https://</a:t>
+              <a:t>://</a:t>
             </a:r>
             <a:r>
               <a:rPr lang="en-US" sz="1500" dirty="0" smtClean="0">
                 <a:latin typeface="Calibri" panose="020F0502020204030204" pitchFamily="34" charset="0"/>
-                <a:hlinkClick r:id="rId5"/>
+                <a:hlinkClick r:id="rId4"/>
               </a:rPr>
               <a:t>youtu.be/EmTz7EAYLrs?t=313</a:t>
             </a:r>

</xml_diff>